<commit_message>
Started my first slide
</commit_message>
<xml_diff>
--- a/PPT for Intro to Data Science.pptx
+++ b/PPT for Intro to Data Science.pptx
@@ -2,15 +2,16 @@
 <file path=ppt/presentation.xml><?xml version="1.0" encoding="utf-8"?>
 <p:presentation xmlns:a="http://schemas.openxmlformats.org/drawingml/2006/main" xmlns:r="http://schemas.openxmlformats.org/officeDocument/2006/relationships" xmlns:p="http://schemas.openxmlformats.org/presentationml/2006/main" saveSubsetFonts="1" autoCompressPictures="0">
   <p:sldMasterIdLst>
-    <p:sldMasterId id="2147483648" r:id="rId1"/>
+    <p:sldMasterId id="2147483660" r:id="rId1"/>
   </p:sldMasterIdLst>
   <p:notesMasterIdLst>
-    <p:notesMasterId r:id="rId5"/>
+    <p:notesMasterId r:id="rId6"/>
   </p:notesMasterIdLst>
   <p:sldIdLst>
     <p:sldId id="256" r:id="rId2"/>
     <p:sldId id="257" r:id="rId3"/>
     <p:sldId id="258" r:id="rId4"/>
+    <p:sldId id="259" r:id="rId5"/>
   </p:sldIdLst>
   <p:sldSz cx="12192000" cy="6858000"/>
   <p:notesSz cx="6858000" cy="9144000"/>
@@ -18,7 +19,7 @@
     <a:defPPr>
       <a:defRPr lang="en-US"/>
     </a:defPPr>
-    <a:lvl1pPr marL="0" algn="l" defTabSz="914400" rtl="0" eaLnBrk="1" latinLnBrk="0" hangingPunct="1">
+    <a:lvl1pPr marL="0" algn="l" defTabSz="457200" rtl="0" eaLnBrk="1" latinLnBrk="0" hangingPunct="1">
       <a:defRPr sz="1800" kern="1200">
         <a:solidFill>
           <a:schemeClr val="tx1"/>
@@ -28,7 +29,7 @@
         <a:cs typeface="+mn-cs"/>
       </a:defRPr>
     </a:lvl1pPr>
-    <a:lvl2pPr marL="457200" algn="l" defTabSz="914400" rtl="0" eaLnBrk="1" latinLnBrk="0" hangingPunct="1">
+    <a:lvl2pPr marL="457200" algn="l" defTabSz="457200" rtl="0" eaLnBrk="1" latinLnBrk="0" hangingPunct="1">
       <a:defRPr sz="1800" kern="1200">
         <a:solidFill>
           <a:schemeClr val="tx1"/>
@@ -38,7 +39,7 @@
         <a:cs typeface="+mn-cs"/>
       </a:defRPr>
     </a:lvl2pPr>
-    <a:lvl3pPr marL="914400" algn="l" defTabSz="914400" rtl="0" eaLnBrk="1" latinLnBrk="0" hangingPunct="1">
+    <a:lvl3pPr marL="914400" algn="l" defTabSz="457200" rtl="0" eaLnBrk="1" latinLnBrk="0" hangingPunct="1">
       <a:defRPr sz="1800" kern="1200">
         <a:solidFill>
           <a:schemeClr val="tx1"/>
@@ -48,7 +49,7 @@
         <a:cs typeface="+mn-cs"/>
       </a:defRPr>
     </a:lvl3pPr>
-    <a:lvl4pPr marL="1371600" algn="l" defTabSz="914400" rtl="0" eaLnBrk="1" latinLnBrk="0" hangingPunct="1">
+    <a:lvl4pPr marL="1371600" algn="l" defTabSz="457200" rtl="0" eaLnBrk="1" latinLnBrk="0" hangingPunct="1">
       <a:defRPr sz="1800" kern="1200">
         <a:solidFill>
           <a:schemeClr val="tx1"/>
@@ -58,7 +59,7 @@
         <a:cs typeface="+mn-cs"/>
       </a:defRPr>
     </a:lvl4pPr>
-    <a:lvl5pPr marL="1828800" algn="l" defTabSz="914400" rtl="0" eaLnBrk="1" latinLnBrk="0" hangingPunct="1">
+    <a:lvl5pPr marL="1828800" algn="l" defTabSz="457200" rtl="0" eaLnBrk="1" latinLnBrk="0" hangingPunct="1">
       <a:defRPr sz="1800" kern="1200">
         <a:solidFill>
           <a:schemeClr val="tx1"/>
@@ -68,7 +69,7 @@
         <a:cs typeface="+mn-cs"/>
       </a:defRPr>
     </a:lvl5pPr>
-    <a:lvl6pPr marL="2286000" algn="l" defTabSz="914400" rtl="0" eaLnBrk="1" latinLnBrk="0" hangingPunct="1">
+    <a:lvl6pPr marL="2286000" algn="l" defTabSz="457200" rtl="0" eaLnBrk="1" latinLnBrk="0" hangingPunct="1">
       <a:defRPr sz="1800" kern="1200">
         <a:solidFill>
           <a:schemeClr val="tx1"/>
@@ -78,7 +79,7 @@
         <a:cs typeface="+mn-cs"/>
       </a:defRPr>
     </a:lvl6pPr>
-    <a:lvl7pPr marL="2743200" algn="l" defTabSz="914400" rtl="0" eaLnBrk="1" latinLnBrk="0" hangingPunct="1">
+    <a:lvl7pPr marL="2743200" algn="l" defTabSz="457200" rtl="0" eaLnBrk="1" latinLnBrk="0" hangingPunct="1">
       <a:defRPr sz="1800" kern="1200">
         <a:solidFill>
           <a:schemeClr val="tx1"/>
@@ -88,7 +89,7 @@
         <a:cs typeface="+mn-cs"/>
       </a:defRPr>
     </a:lvl7pPr>
-    <a:lvl8pPr marL="3200400" algn="l" defTabSz="914400" rtl="0" eaLnBrk="1" latinLnBrk="0" hangingPunct="1">
+    <a:lvl8pPr marL="3200400" algn="l" defTabSz="457200" rtl="0" eaLnBrk="1" latinLnBrk="0" hangingPunct="1">
       <a:defRPr sz="1800" kern="1200">
         <a:solidFill>
           <a:schemeClr val="tx1"/>
@@ -98,7 +99,7 @@
         <a:cs typeface="+mn-cs"/>
       </a:defRPr>
     </a:lvl8pPr>
-    <a:lvl9pPr marL="3657600" algn="l" defTabSz="914400" rtl="0" eaLnBrk="1" latinLnBrk="0" hangingPunct="1">
+    <a:lvl9pPr marL="3657600" algn="l" defTabSz="457200" rtl="0" eaLnBrk="1" latinLnBrk="0" hangingPunct="1">
       <a:defRPr sz="1800" kern="1200">
         <a:solidFill>
           <a:schemeClr val="tx1"/>
@@ -199,7 +200,7 @@
           <a:p>
             <a:fld id="{9F7B77B6-A42E-A048-A74D-7373B9F65E74}" type="datetimeFigureOut">
               <a:rPr lang="en-US" smtClean="0"/>
-              <a:t>11/1/22</a:t>
+              <a:t>11/2/2022</a:t>
             </a:fld>
             <a:endParaRPr lang="en-US"/>
           </a:p>
@@ -569,13 +570,7 @@
       </p:grpSpPr>
       <p:sp>
         <p:nvSpPr>
-          <p:cNvPr id="2" name="Title 1">
-            <a:extLst>
-              <a:ext uri="{FF2B5EF4-FFF2-40B4-BE49-F238E27FC236}">
-                <a16:creationId xmlns:a16="http://schemas.microsoft.com/office/drawing/2014/main" id="{65A2B425-E0C6-8DEA-378E-A3475F090E85}"/>
-              </a:ext>
-            </a:extLst>
-          </p:cNvPr>
+          <p:cNvPr id="2" name="Title 1"/>
           <p:cNvSpPr>
             <a:spLocks noGrp="1"/>
           </p:cNvSpPr>
@@ -601,18 +596,13 @@
               <a:rPr lang="en-US"/>
               <a:t>Click to edit Master title style</a:t>
             </a:r>
-          </a:p>
-        </p:txBody>
-      </p:sp>
-      <p:sp>
-        <p:nvSpPr>
-          <p:cNvPr id="3" name="Subtitle 2">
-            <a:extLst>
-              <a:ext uri="{FF2B5EF4-FFF2-40B4-BE49-F238E27FC236}">
-                <a16:creationId xmlns:a16="http://schemas.microsoft.com/office/drawing/2014/main" id="{B381EE5F-66C9-29B8-AA3A-F59BF66D65F0}"/>
-              </a:ext>
-            </a:extLst>
-          </p:cNvPr>
+            <a:endParaRPr lang="en-US" dirty="0"/>
+          </a:p>
+        </p:txBody>
+      </p:sp>
+      <p:sp>
+        <p:nvSpPr>
+          <p:cNvPr id="3" name="Subtitle 2"/>
           <p:cNvSpPr>
             <a:spLocks noGrp="1"/>
           </p:cNvSpPr>
@@ -671,18 +661,13 @@
               <a:rPr lang="en-US"/>
               <a:t>Click to edit Master subtitle style</a:t>
             </a:r>
-          </a:p>
-        </p:txBody>
-      </p:sp>
-      <p:sp>
-        <p:nvSpPr>
-          <p:cNvPr id="4" name="Date Placeholder 3">
-            <a:extLst>
-              <a:ext uri="{FF2B5EF4-FFF2-40B4-BE49-F238E27FC236}">
-                <a16:creationId xmlns:a16="http://schemas.microsoft.com/office/drawing/2014/main" id="{02432BE6-43A9-0840-D035-063DDBB70B4E}"/>
-              </a:ext>
-            </a:extLst>
-          </p:cNvPr>
+            <a:endParaRPr lang="en-US" dirty="0"/>
+          </a:p>
+        </p:txBody>
+      </p:sp>
+      <p:sp>
+        <p:nvSpPr>
+          <p:cNvPr id="4" name="Date Placeholder 3"/>
           <p:cNvSpPr>
             <a:spLocks noGrp="1"/>
           </p:cNvSpPr>
@@ -697,7 +682,7 @@
           <a:p>
             <a:fld id="{5DCE9035-4A16-5448-9596-651BFBF89D25}" type="datetimeFigureOut">
               <a:rPr lang="en-US" smtClean="0"/>
-              <a:t>11/1/22</a:t>
+              <a:t>11/2/2022</a:t>
             </a:fld>
             <a:endParaRPr lang="en-US"/>
           </a:p>
@@ -705,13 +690,7 @@
       </p:sp>
       <p:sp>
         <p:nvSpPr>
-          <p:cNvPr id="5" name="Footer Placeholder 4">
-            <a:extLst>
-              <a:ext uri="{FF2B5EF4-FFF2-40B4-BE49-F238E27FC236}">
-                <a16:creationId xmlns:a16="http://schemas.microsoft.com/office/drawing/2014/main" id="{8E33AB04-C8F7-BAC7-3F40-5CD271C7D992}"/>
-              </a:ext>
-            </a:extLst>
-          </p:cNvPr>
+          <p:cNvPr id="5" name="Footer Placeholder 4"/>
           <p:cNvSpPr>
             <a:spLocks noGrp="1"/>
           </p:cNvSpPr>
@@ -730,13 +709,7 @@
       </p:sp>
       <p:sp>
         <p:nvSpPr>
-          <p:cNvPr id="6" name="Slide Number Placeholder 5">
-            <a:extLst>
-              <a:ext uri="{FF2B5EF4-FFF2-40B4-BE49-F238E27FC236}">
-                <a16:creationId xmlns:a16="http://schemas.microsoft.com/office/drawing/2014/main" id="{44D34F57-8814-BEA8-2188-716A44B82BAB}"/>
-              </a:ext>
-            </a:extLst>
-          </p:cNvPr>
+          <p:cNvPr id="6" name="Slide Number Placeholder 5"/>
           <p:cNvSpPr>
             <a:spLocks noGrp="1"/>
           </p:cNvSpPr>
@@ -760,7 +733,7 @@
     </p:spTree>
     <p:extLst>
       <p:ext uri="{BB962C8B-B14F-4D97-AF65-F5344CB8AC3E}">
-        <p14:creationId xmlns:p14="http://schemas.microsoft.com/office/powerpoint/2010/main" val="220692825"/>
+        <p14:creationId xmlns:p14="http://schemas.microsoft.com/office/powerpoint/2010/main" val="1539024890"/>
       </p:ext>
     </p:extLst>
   </p:cSld>
@@ -789,13 +762,7 @@
       </p:grpSpPr>
       <p:sp>
         <p:nvSpPr>
-          <p:cNvPr id="2" name="Title 1">
-            <a:extLst>
-              <a:ext uri="{FF2B5EF4-FFF2-40B4-BE49-F238E27FC236}">
-                <a16:creationId xmlns:a16="http://schemas.microsoft.com/office/drawing/2014/main" id="{3D172579-0E5D-F9BE-D7F4-41EEBE13DDD3}"/>
-              </a:ext>
-            </a:extLst>
-          </p:cNvPr>
+          <p:cNvPr id="2" name="Title 1"/>
           <p:cNvSpPr>
             <a:spLocks noGrp="1"/>
           </p:cNvSpPr>
@@ -812,18 +779,13 @@
               <a:rPr lang="en-US"/>
               <a:t>Click to edit Master title style</a:t>
             </a:r>
-          </a:p>
-        </p:txBody>
-      </p:sp>
-      <p:sp>
-        <p:nvSpPr>
-          <p:cNvPr id="3" name="Vertical Text Placeholder 2">
-            <a:extLst>
-              <a:ext uri="{FF2B5EF4-FFF2-40B4-BE49-F238E27FC236}">
-                <a16:creationId xmlns:a16="http://schemas.microsoft.com/office/drawing/2014/main" id="{5BB8AE9A-A7AD-1206-5429-70F3355C9FE1}"/>
-              </a:ext>
-            </a:extLst>
-          </p:cNvPr>
+            <a:endParaRPr lang="en-US" dirty="0"/>
+          </a:p>
+        </p:txBody>
+      </p:sp>
+      <p:sp>
+        <p:nvSpPr>
+          <p:cNvPr id="3" name="Vertical Text Placeholder 2"/>
           <p:cNvSpPr>
             <a:spLocks noGrp="1"/>
           </p:cNvSpPr>
@@ -869,18 +831,13 @@
               <a:rPr lang="en-US"/>
               <a:t>Fifth level</a:t>
             </a:r>
-          </a:p>
-        </p:txBody>
-      </p:sp>
-      <p:sp>
-        <p:nvSpPr>
-          <p:cNvPr id="4" name="Date Placeholder 3">
-            <a:extLst>
-              <a:ext uri="{FF2B5EF4-FFF2-40B4-BE49-F238E27FC236}">
-                <a16:creationId xmlns:a16="http://schemas.microsoft.com/office/drawing/2014/main" id="{62391A9C-3C8F-4864-DC97-EE5E91083E9A}"/>
-              </a:ext>
-            </a:extLst>
-          </p:cNvPr>
+            <a:endParaRPr lang="en-US" dirty="0"/>
+          </a:p>
+        </p:txBody>
+      </p:sp>
+      <p:sp>
+        <p:nvSpPr>
+          <p:cNvPr id="4" name="Date Placeholder 3"/>
           <p:cNvSpPr>
             <a:spLocks noGrp="1"/>
           </p:cNvSpPr>
@@ -895,7 +852,7 @@
           <a:p>
             <a:fld id="{5DCE9035-4A16-5448-9596-651BFBF89D25}" type="datetimeFigureOut">
               <a:rPr lang="en-US" smtClean="0"/>
-              <a:t>11/1/22</a:t>
+              <a:t>11/2/2022</a:t>
             </a:fld>
             <a:endParaRPr lang="en-US"/>
           </a:p>
@@ -903,13 +860,7 @@
       </p:sp>
       <p:sp>
         <p:nvSpPr>
-          <p:cNvPr id="5" name="Footer Placeholder 4">
-            <a:extLst>
-              <a:ext uri="{FF2B5EF4-FFF2-40B4-BE49-F238E27FC236}">
-                <a16:creationId xmlns:a16="http://schemas.microsoft.com/office/drawing/2014/main" id="{1E2F9CAE-74F1-4A20-E710-223C88DB7C35}"/>
-              </a:ext>
-            </a:extLst>
-          </p:cNvPr>
+          <p:cNvPr id="5" name="Footer Placeholder 4"/>
           <p:cNvSpPr>
             <a:spLocks noGrp="1"/>
           </p:cNvSpPr>
@@ -928,13 +879,7 @@
       </p:sp>
       <p:sp>
         <p:nvSpPr>
-          <p:cNvPr id="6" name="Slide Number Placeholder 5">
-            <a:extLst>
-              <a:ext uri="{FF2B5EF4-FFF2-40B4-BE49-F238E27FC236}">
-                <a16:creationId xmlns:a16="http://schemas.microsoft.com/office/drawing/2014/main" id="{707F8F41-6AEE-ECBB-923D-62037706E225}"/>
-              </a:ext>
-            </a:extLst>
-          </p:cNvPr>
+          <p:cNvPr id="6" name="Slide Number Placeholder 5"/>
           <p:cNvSpPr>
             <a:spLocks noGrp="1"/>
           </p:cNvSpPr>
@@ -958,7 +903,7 @@
     </p:spTree>
     <p:extLst>
       <p:ext uri="{BB962C8B-B14F-4D97-AF65-F5344CB8AC3E}">
-        <p14:creationId xmlns:p14="http://schemas.microsoft.com/office/powerpoint/2010/main" val="3650443055"/>
+        <p14:creationId xmlns:p14="http://schemas.microsoft.com/office/powerpoint/2010/main" val="2899944673"/>
       </p:ext>
     </p:extLst>
   </p:cSld>
@@ -987,13 +932,7 @@
       </p:grpSpPr>
       <p:sp>
         <p:nvSpPr>
-          <p:cNvPr id="2" name="Vertical Title 1">
-            <a:extLst>
-              <a:ext uri="{FF2B5EF4-FFF2-40B4-BE49-F238E27FC236}">
-                <a16:creationId xmlns:a16="http://schemas.microsoft.com/office/drawing/2014/main" id="{93C82F64-CA24-98C4-67D6-448A5A6B4BCA}"/>
-              </a:ext>
-            </a:extLst>
-          </p:cNvPr>
+          <p:cNvPr id="2" name="Vertical Title 1"/>
           <p:cNvSpPr>
             <a:spLocks noGrp="1"/>
           </p:cNvSpPr>
@@ -1015,18 +954,13 @@
               <a:rPr lang="en-US"/>
               <a:t>Click to edit Master title style</a:t>
             </a:r>
-          </a:p>
-        </p:txBody>
-      </p:sp>
-      <p:sp>
-        <p:nvSpPr>
-          <p:cNvPr id="3" name="Vertical Text Placeholder 2">
-            <a:extLst>
-              <a:ext uri="{FF2B5EF4-FFF2-40B4-BE49-F238E27FC236}">
-                <a16:creationId xmlns:a16="http://schemas.microsoft.com/office/drawing/2014/main" id="{61167FCC-83E5-E7F8-6F22-06CB65C976DE}"/>
-              </a:ext>
-            </a:extLst>
-          </p:cNvPr>
+            <a:endParaRPr lang="en-US" dirty="0"/>
+          </a:p>
+        </p:txBody>
+      </p:sp>
+      <p:sp>
+        <p:nvSpPr>
+          <p:cNvPr id="3" name="Vertical Text Placeholder 2"/>
           <p:cNvSpPr>
             <a:spLocks noGrp="1"/>
           </p:cNvSpPr>
@@ -1077,18 +1011,13 @@
               <a:rPr lang="en-US"/>
               <a:t>Fifth level</a:t>
             </a:r>
-          </a:p>
-        </p:txBody>
-      </p:sp>
-      <p:sp>
-        <p:nvSpPr>
-          <p:cNvPr id="4" name="Date Placeholder 3">
-            <a:extLst>
-              <a:ext uri="{FF2B5EF4-FFF2-40B4-BE49-F238E27FC236}">
-                <a16:creationId xmlns:a16="http://schemas.microsoft.com/office/drawing/2014/main" id="{D610FCEC-1CFE-2282-BCB1-1168CC1B9797}"/>
-              </a:ext>
-            </a:extLst>
-          </p:cNvPr>
+            <a:endParaRPr lang="en-US" dirty="0"/>
+          </a:p>
+        </p:txBody>
+      </p:sp>
+      <p:sp>
+        <p:nvSpPr>
+          <p:cNvPr id="4" name="Date Placeholder 3"/>
           <p:cNvSpPr>
             <a:spLocks noGrp="1"/>
           </p:cNvSpPr>
@@ -1103,7 +1032,7 @@
           <a:p>
             <a:fld id="{5DCE9035-4A16-5448-9596-651BFBF89D25}" type="datetimeFigureOut">
               <a:rPr lang="en-US" smtClean="0"/>
-              <a:t>11/1/22</a:t>
+              <a:t>11/2/2022</a:t>
             </a:fld>
             <a:endParaRPr lang="en-US"/>
           </a:p>
@@ -1111,13 +1040,7 @@
       </p:sp>
       <p:sp>
         <p:nvSpPr>
-          <p:cNvPr id="5" name="Footer Placeholder 4">
-            <a:extLst>
-              <a:ext uri="{FF2B5EF4-FFF2-40B4-BE49-F238E27FC236}">
-                <a16:creationId xmlns:a16="http://schemas.microsoft.com/office/drawing/2014/main" id="{4D085DE0-82FF-83B4-B122-196176D5B919}"/>
-              </a:ext>
-            </a:extLst>
-          </p:cNvPr>
+          <p:cNvPr id="5" name="Footer Placeholder 4"/>
           <p:cNvSpPr>
             <a:spLocks noGrp="1"/>
           </p:cNvSpPr>
@@ -1136,13 +1059,7 @@
       </p:sp>
       <p:sp>
         <p:nvSpPr>
-          <p:cNvPr id="6" name="Slide Number Placeholder 5">
-            <a:extLst>
-              <a:ext uri="{FF2B5EF4-FFF2-40B4-BE49-F238E27FC236}">
-                <a16:creationId xmlns:a16="http://schemas.microsoft.com/office/drawing/2014/main" id="{ED1B1B4A-8567-F9EB-9D66-E13E59B780F8}"/>
-              </a:ext>
-            </a:extLst>
-          </p:cNvPr>
+          <p:cNvPr id="6" name="Slide Number Placeholder 5"/>
           <p:cNvSpPr>
             <a:spLocks noGrp="1"/>
           </p:cNvSpPr>
@@ -1166,7 +1083,7 @@
     </p:spTree>
     <p:extLst>
       <p:ext uri="{BB962C8B-B14F-4D97-AF65-F5344CB8AC3E}">
-        <p14:creationId xmlns:p14="http://schemas.microsoft.com/office/powerpoint/2010/main" val="975947264"/>
+        <p14:creationId xmlns:p14="http://schemas.microsoft.com/office/powerpoint/2010/main" val="2455787791"/>
       </p:ext>
     </p:extLst>
   </p:cSld>
@@ -1195,13 +1112,7 @@
       </p:grpSpPr>
       <p:sp>
         <p:nvSpPr>
-          <p:cNvPr id="2" name="Title 1">
-            <a:extLst>
-              <a:ext uri="{FF2B5EF4-FFF2-40B4-BE49-F238E27FC236}">
-                <a16:creationId xmlns:a16="http://schemas.microsoft.com/office/drawing/2014/main" id="{27CE48FA-6E79-FD22-D96E-D5D3287EC976}"/>
-              </a:ext>
-            </a:extLst>
-          </p:cNvPr>
+          <p:cNvPr id="2" name="Title 1"/>
           <p:cNvSpPr>
             <a:spLocks noGrp="1"/>
           </p:cNvSpPr>
@@ -1218,18 +1129,13 @@
               <a:rPr lang="en-US"/>
               <a:t>Click to edit Master title style</a:t>
             </a:r>
-          </a:p>
-        </p:txBody>
-      </p:sp>
-      <p:sp>
-        <p:nvSpPr>
-          <p:cNvPr id="3" name="Content Placeholder 2">
-            <a:extLst>
-              <a:ext uri="{FF2B5EF4-FFF2-40B4-BE49-F238E27FC236}">
-                <a16:creationId xmlns:a16="http://schemas.microsoft.com/office/drawing/2014/main" id="{F620A05F-29AB-20F9-950A-1A316F38FBFA}"/>
-              </a:ext>
-            </a:extLst>
-          </p:cNvPr>
+            <a:endParaRPr lang="en-US" dirty="0"/>
+          </a:p>
+        </p:txBody>
+      </p:sp>
+      <p:sp>
+        <p:nvSpPr>
+          <p:cNvPr id="3" name="Content Placeholder 2"/>
           <p:cNvSpPr>
             <a:spLocks noGrp="1"/>
           </p:cNvSpPr>
@@ -1275,18 +1181,13 @@
               <a:rPr lang="en-US"/>
               <a:t>Fifth level</a:t>
             </a:r>
-          </a:p>
-        </p:txBody>
-      </p:sp>
-      <p:sp>
-        <p:nvSpPr>
-          <p:cNvPr id="4" name="Date Placeholder 3">
-            <a:extLst>
-              <a:ext uri="{FF2B5EF4-FFF2-40B4-BE49-F238E27FC236}">
-                <a16:creationId xmlns:a16="http://schemas.microsoft.com/office/drawing/2014/main" id="{BABC5F1B-1E23-0F16-D996-4E54AA666229}"/>
-              </a:ext>
-            </a:extLst>
-          </p:cNvPr>
+            <a:endParaRPr lang="en-US" dirty="0"/>
+          </a:p>
+        </p:txBody>
+      </p:sp>
+      <p:sp>
+        <p:nvSpPr>
+          <p:cNvPr id="4" name="Date Placeholder 3"/>
           <p:cNvSpPr>
             <a:spLocks noGrp="1"/>
           </p:cNvSpPr>
@@ -1301,7 +1202,7 @@
           <a:p>
             <a:fld id="{5DCE9035-4A16-5448-9596-651BFBF89D25}" type="datetimeFigureOut">
               <a:rPr lang="en-US" smtClean="0"/>
-              <a:t>11/1/22</a:t>
+              <a:t>11/2/2022</a:t>
             </a:fld>
             <a:endParaRPr lang="en-US"/>
           </a:p>
@@ -1309,13 +1210,7 @@
       </p:sp>
       <p:sp>
         <p:nvSpPr>
-          <p:cNvPr id="5" name="Footer Placeholder 4">
-            <a:extLst>
-              <a:ext uri="{FF2B5EF4-FFF2-40B4-BE49-F238E27FC236}">
-                <a16:creationId xmlns:a16="http://schemas.microsoft.com/office/drawing/2014/main" id="{B158D158-9114-DF36-02F2-D0B9206CCAAC}"/>
-              </a:ext>
-            </a:extLst>
-          </p:cNvPr>
+          <p:cNvPr id="5" name="Footer Placeholder 4"/>
           <p:cNvSpPr>
             <a:spLocks noGrp="1"/>
           </p:cNvSpPr>
@@ -1334,13 +1229,7 @@
       </p:sp>
       <p:sp>
         <p:nvSpPr>
-          <p:cNvPr id="6" name="Slide Number Placeholder 5">
-            <a:extLst>
-              <a:ext uri="{FF2B5EF4-FFF2-40B4-BE49-F238E27FC236}">
-                <a16:creationId xmlns:a16="http://schemas.microsoft.com/office/drawing/2014/main" id="{2C205808-3C08-3DDE-3306-1E88F7B945F4}"/>
-              </a:ext>
-            </a:extLst>
-          </p:cNvPr>
+          <p:cNvPr id="6" name="Slide Number Placeholder 5"/>
           <p:cNvSpPr>
             <a:spLocks noGrp="1"/>
           </p:cNvSpPr>
@@ -1364,7 +1253,7 @@
     </p:spTree>
     <p:extLst>
       <p:ext uri="{BB962C8B-B14F-4D97-AF65-F5344CB8AC3E}">
-        <p14:creationId xmlns:p14="http://schemas.microsoft.com/office/powerpoint/2010/main" val="4157055781"/>
+        <p14:creationId xmlns:p14="http://schemas.microsoft.com/office/powerpoint/2010/main" val="1969123297"/>
       </p:ext>
     </p:extLst>
   </p:cSld>
@@ -1393,13 +1282,7 @@
       </p:grpSpPr>
       <p:sp>
         <p:nvSpPr>
-          <p:cNvPr id="2" name="Title 1">
-            <a:extLst>
-              <a:ext uri="{FF2B5EF4-FFF2-40B4-BE49-F238E27FC236}">
-                <a16:creationId xmlns:a16="http://schemas.microsoft.com/office/drawing/2014/main" id="{6ACA4B26-B884-37B7-D61D-97AF86133FE0}"/>
-              </a:ext>
-            </a:extLst>
-          </p:cNvPr>
+          <p:cNvPr id="2" name="Title 1"/>
           <p:cNvSpPr>
             <a:spLocks noGrp="1"/>
           </p:cNvSpPr>
@@ -1425,18 +1308,13 @@
               <a:rPr lang="en-US"/>
               <a:t>Click to edit Master title style</a:t>
             </a:r>
-          </a:p>
-        </p:txBody>
-      </p:sp>
-      <p:sp>
-        <p:nvSpPr>
-          <p:cNvPr id="3" name="Text Placeholder 2">
-            <a:extLst>
-              <a:ext uri="{FF2B5EF4-FFF2-40B4-BE49-F238E27FC236}">
-                <a16:creationId xmlns:a16="http://schemas.microsoft.com/office/drawing/2014/main" id="{9539FED3-5DEE-6692-C3AA-A4968F4C0C05}"/>
-              </a:ext>
-            </a:extLst>
-          </p:cNvPr>
+            <a:endParaRPr lang="en-US" dirty="0"/>
+          </a:p>
+        </p:txBody>
+      </p:sp>
+      <p:sp>
+        <p:nvSpPr>
+          <p:cNvPr id="3" name="Text Placeholder 2"/>
           <p:cNvSpPr>
             <a:spLocks noGrp="1"/>
           </p:cNvSpPr>
@@ -1555,13 +1433,7 @@
       </p:sp>
       <p:sp>
         <p:nvSpPr>
-          <p:cNvPr id="4" name="Date Placeholder 3">
-            <a:extLst>
-              <a:ext uri="{FF2B5EF4-FFF2-40B4-BE49-F238E27FC236}">
-                <a16:creationId xmlns:a16="http://schemas.microsoft.com/office/drawing/2014/main" id="{2334EE62-81FE-A687-3CE0-6476C451023B}"/>
-              </a:ext>
-            </a:extLst>
-          </p:cNvPr>
+          <p:cNvPr id="4" name="Date Placeholder 3"/>
           <p:cNvSpPr>
             <a:spLocks noGrp="1"/>
           </p:cNvSpPr>
@@ -1576,7 +1448,7 @@
           <a:p>
             <a:fld id="{5DCE9035-4A16-5448-9596-651BFBF89D25}" type="datetimeFigureOut">
               <a:rPr lang="en-US" smtClean="0"/>
-              <a:t>11/1/22</a:t>
+              <a:t>11/2/2022</a:t>
             </a:fld>
             <a:endParaRPr lang="en-US"/>
           </a:p>
@@ -1584,13 +1456,7 @@
       </p:sp>
       <p:sp>
         <p:nvSpPr>
-          <p:cNvPr id="5" name="Footer Placeholder 4">
-            <a:extLst>
-              <a:ext uri="{FF2B5EF4-FFF2-40B4-BE49-F238E27FC236}">
-                <a16:creationId xmlns:a16="http://schemas.microsoft.com/office/drawing/2014/main" id="{FFB9B2E4-2041-E1E8-B539-A6CCAAAD8FB5}"/>
-              </a:ext>
-            </a:extLst>
-          </p:cNvPr>
+          <p:cNvPr id="5" name="Footer Placeholder 4"/>
           <p:cNvSpPr>
             <a:spLocks noGrp="1"/>
           </p:cNvSpPr>
@@ -1609,13 +1475,7 @@
       </p:sp>
       <p:sp>
         <p:nvSpPr>
-          <p:cNvPr id="6" name="Slide Number Placeholder 5">
-            <a:extLst>
-              <a:ext uri="{FF2B5EF4-FFF2-40B4-BE49-F238E27FC236}">
-                <a16:creationId xmlns:a16="http://schemas.microsoft.com/office/drawing/2014/main" id="{47723FC1-A892-8956-2457-181A7CEAE1C7}"/>
-              </a:ext>
-            </a:extLst>
-          </p:cNvPr>
+          <p:cNvPr id="6" name="Slide Number Placeholder 5"/>
           <p:cNvSpPr>
             <a:spLocks noGrp="1"/>
           </p:cNvSpPr>
@@ -1639,7 +1499,7 @@
     </p:spTree>
     <p:extLst>
       <p:ext uri="{BB962C8B-B14F-4D97-AF65-F5344CB8AC3E}">
-        <p14:creationId xmlns:p14="http://schemas.microsoft.com/office/powerpoint/2010/main" val="82298373"/>
+        <p14:creationId xmlns:p14="http://schemas.microsoft.com/office/powerpoint/2010/main" val="589042149"/>
       </p:ext>
     </p:extLst>
   </p:cSld>
@@ -1668,13 +1528,7 @@
       </p:grpSpPr>
       <p:sp>
         <p:nvSpPr>
-          <p:cNvPr id="2" name="Title 1">
-            <a:extLst>
-              <a:ext uri="{FF2B5EF4-FFF2-40B4-BE49-F238E27FC236}">
-                <a16:creationId xmlns:a16="http://schemas.microsoft.com/office/drawing/2014/main" id="{8466415B-9D30-B3B5-91A1-666CF8FCC3EB}"/>
-              </a:ext>
-            </a:extLst>
-          </p:cNvPr>
+          <p:cNvPr id="2" name="Title 1"/>
           <p:cNvSpPr>
             <a:spLocks noGrp="1"/>
           </p:cNvSpPr>
@@ -1691,18 +1545,13 @@
               <a:rPr lang="en-US"/>
               <a:t>Click to edit Master title style</a:t>
             </a:r>
-          </a:p>
-        </p:txBody>
-      </p:sp>
-      <p:sp>
-        <p:nvSpPr>
-          <p:cNvPr id="3" name="Content Placeholder 2">
-            <a:extLst>
-              <a:ext uri="{FF2B5EF4-FFF2-40B4-BE49-F238E27FC236}">
-                <a16:creationId xmlns:a16="http://schemas.microsoft.com/office/drawing/2014/main" id="{9EA69E8E-D43C-B167-6BF9-07D50DE78D1D}"/>
-              </a:ext>
-            </a:extLst>
-          </p:cNvPr>
+            <a:endParaRPr lang="en-US" dirty="0"/>
+          </a:p>
+        </p:txBody>
+      </p:sp>
+      <p:sp>
+        <p:nvSpPr>
+          <p:cNvPr id="3" name="Content Placeholder 2"/>
           <p:cNvSpPr>
             <a:spLocks noGrp="1"/>
           </p:cNvSpPr>
@@ -1753,18 +1602,13 @@
               <a:rPr lang="en-US"/>
               <a:t>Fifth level</a:t>
             </a:r>
-          </a:p>
-        </p:txBody>
-      </p:sp>
-      <p:sp>
-        <p:nvSpPr>
-          <p:cNvPr id="4" name="Content Placeholder 3">
-            <a:extLst>
-              <a:ext uri="{FF2B5EF4-FFF2-40B4-BE49-F238E27FC236}">
-                <a16:creationId xmlns:a16="http://schemas.microsoft.com/office/drawing/2014/main" id="{F3AF7CB4-DD16-F49E-7304-DCFD55D8B533}"/>
-              </a:ext>
-            </a:extLst>
-          </p:cNvPr>
+            <a:endParaRPr lang="en-US" dirty="0"/>
+          </a:p>
+        </p:txBody>
+      </p:sp>
+      <p:sp>
+        <p:nvSpPr>
+          <p:cNvPr id="4" name="Content Placeholder 3"/>
           <p:cNvSpPr>
             <a:spLocks noGrp="1"/>
           </p:cNvSpPr>
@@ -1815,18 +1659,13 @@
               <a:rPr lang="en-US"/>
               <a:t>Fifth level</a:t>
             </a:r>
-          </a:p>
-        </p:txBody>
-      </p:sp>
-      <p:sp>
-        <p:nvSpPr>
-          <p:cNvPr id="5" name="Date Placeholder 4">
-            <a:extLst>
-              <a:ext uri="{FF2B5EF4-FFF2-40B4-BE49-F238E27FC236}">
-                <a16:creationId xmlns:a16="http://schemas.microsoft.com/office/drawing/2014/main" id="{C9199C92-01AC-0563-8D6C-D778DF30EFE8}"/>
-              </a:ext>
-            </a:extLst>
-          </p:cNvPr>
+            <a:endParaRPr lang="en-US" dirty="0"/>
+          </a:p>
+        </p:txBody>
+      </p:sp>
+      <p:sp>
+        <p:nvSpPr>
+          <p:cNvPr id="5" name="Date Placeholder 4"/>
           <p:cNvSpPr>
             <a:spLocks noGrp="1"/>
           </p:cNvSpPr>
@@ -1841,7 +1680,7 @@
           <a:p>
             <a:fld id="{5DCE9035-4A16-5448-9596-651BFBF89D25}" type="datetimeFigureOut">
               <a:rPr lang="en-US" smtClean="0"/>
-              <a:t>11/1/22</a:t>
+              <a:t>11/2/2022</a:t>
             </a:fld>
             <a:endParaRPr lang="en-US"/>
           </a:p>
@@ -1849,13 +1688,7 @@
       </p:sp>
       <p:sp>
         <p:nvSpPr>
-          <p:cNvPr id="6" name="Footer Placeholder 5">
-            <a:extLst>
-              <a:ext uri="{FF2B5EF4-FFF2-40B4-BE49-F238E27FC236}">
-                <a16:creationId xmlns:a16="http://schemas.microsoft.com/office/drawing/2014/main" id="{E22A0D12-5D10-D127-6EC0-715EA889412D}"/>
-              </a:ext>
-            </a:extLst>
-          </p:cNvPr>
+          <p:cNvPr id="6" name="Footer Placeholder 5"/>
           <p:cNvSpPr>
             <a:spLocks noGrp="1"/>
           </p:cNvSpPr>
@@ -1874,13 +1707,7 @@
       </p:sp>
       <p:sp>
         <p:nvSpPr>
-          <p:cNvPr id="7" name="Slide Number Placeholder 6">
-            <a:extLst>
-              <a:ext uri="{FF2B5EF4-FFF2-40B4-BE49-F238E27FC236}">
-                <a16:creationId xmlns:a16="http://schemas.microsoft.com/office/drawing/2014/main" id="{8575DDFF-680E-D605-80D8-BD9A871440D1}"/>
-              </a:ext>
-            </a:extLst>
-          </p:cNvPr>
+          <p:cNvPr id="7" name="Slide Number Placeholder 6"/>
           <p:cNvSpPr>
             <a:spLocks noGrp="1"/>
           </p:cNvSpPr>
@@ -1904,7 +1731,7 @@
     </p:spTree>
     <p:extLst>
       <p:ext uri="{BB962C8B-B14F-4D97-AF65-F5344CB8AC3E}">
-        <p14:creationId xmlns:p14="http://schemas.microsoft.com/office/powerpoint/2010/main" val="3176205585"/>
+        <p14:creationId xmlns:p14="http://schemas.microsoft.com/office/powerpoint/2010/main" val="4239506515"/>
       </p:ext>
     </p:extLst>
   </p:cSld>
@@ -1933,13 +1760,7 @@
       </p:grpSpPr>
       <p:sp>
         <p:nvSpPr>
-          <p:cNvPr id="2" name="Title 1">
-            <a:extLst>
-              <a:ext uri="{FF2B5EF4-FFF2-40B4-BE49-F238E27FC236}">
-                <a16:creationId xmlns:a16="http://schemas.microsoft.com/office/drawing/2014/main" id="{C520F00E-D53E-BA0B-621E-93FCE59A187E}"/>
-              </a:ext>
-            </a:extLst>
-          </p:cNvPr>
+          <p:cNvPr id="2" name="Title 1"/>
           <p:cNvSpPr>
             <a:spLocks noGrp="1"/>
           </p:cNvSpPr>
@@ -1961,18 +1782,13 @@
               <a:rPr lang="en-US"/>
               <a:t>Click to edit Master title style</a:t>
             </a:r>
-          </a:p>
-        </p:txBody>
-      </p:sp>
-      <p:sp>
-        <p:nvSpPr>
-          <p:cNvPr id="3" name="Text Placeholder 2">
-            <a:extLst>
-              <a:ext uri="{FF2B5EF4-FFF2-40B4-BE49-F238E27FC236}">
-                <a16:creationId xmlns:a16="http://schemas.microsoft.com/office/drawing/2014/main" id="{EE628D6B-26A7-2F43-65B1-D7B89348FD3B}"/>
-              </a:ext>
-            </a:extLst>
-          </p:cNvPr>
+            <a:endParaRPr lang="en-US" dirty="0"/>
+          </a:p>
+        </p:txBody>
+      </p:sp>
+      <p:sp>
+        <p:nvSpPr>
+          <p:cNvPr id="3" name="Text Placeholder 2"/>
           <p:cNvSpPr>
             <a:spLocks noGrp="1"/>
           </p:cNvSpPr>
@@ -2037,13 +1853,7 @@
       </p:sp>
       <p:sp>
         <p:nvSpPr>
-          <p:cNvPr id="4" name="Content Placeholder 3">
-            <a:extLst>
-              <a:ext uri="{FF2B5EF4-FFF2-40B4-BE49-F238E27FC236}">
-                <a16:creationId xmlns:a16="http://schemas.microsoft.com/office/drawing/2014/main" id="{8791FB21-1053-DE39-C6EB-B26B9C46D9D9}"/>
-              </a:ext>
-            </a:extLst>
-          </p:cNvPr>
+          <p:cNvPr id="4" name="Content Placeholder 3"/>
           <p:cNvSpPr>
             <a:spLocks noGrp="1"/>
           </p:cNvSpPr>
@@ -2094,18 +1904,13 @@
               <a:rPr lang="en-US"/>
               <a:t>Fifth level</a:t>
             </a:r>
-          </a:p>
-        </p:txBody>
-      </p:sp>
-      <p:sp>
-        <p:nvSpPr>
-          <p:cNvPr id="5" name="Text Placeholder 4">
-            <a:extLst>
-              <a:ext uri="{FF2B5EF4-FFF2-40B4-BE49-F238E27FC236}">
-                <a16:creationId xmlns:a16="http://schemas.microsoft.com/office/drawing/2014/main" id="{937BE587-0353-93A3-45D4-1E269E25339E}"/>
-              </a:ext>
-            </a:extLst>
-          </p:cNvPr>
+            <a:endParaRPr lang="en-US" dirty="0"/>
+          </a:p>
+        </p:txBody>
+      </p:sp>
+      <p:sp>
+        <p:nvSpPr>
+          <p:cNvPr id="5" name="Text Placeholder 4"/>
           <p:cNvSpPr>
             <a:spLocks noGrp="1"/>
           </p:cNvSpPr>
@@ -2170,13 +1975,7 @@
       </p:sp>
       <p:sp>
         <p:nvSpPr>
-          <p:cNvPr id="6" name="Content Placeholder 5">
-            <a:extLst>
-              <a:ext uri="{FF2B5EF4-FFF2-40B4-BE49-F238E27FC236}">
-                <a16:creationId xmlns:a16="http://schemas.microsoft.com/office/drawing/2014/main" id="{CD58360D-C0E7-1D70-293E-EB00221ACACB}"/>
-              </a:ext>
-            </a:extLst>
-          </p:cNvPr>
+          <p:cNvPr id="6" name="Content Placeholder 5"/>
           <p:cNvSpPr>
             <a:spLocks noGrp="1"/>
           </p:cNvSpPr>
@@ -2227,18 +2026,13 @@
               <a:rPr lang="en-US"/>
               <a:t>Fifth level</a:t>
             </a:r>
-          </a:p>
-        </p:txBody>
-      </p:sp>
-      <p:sp>
-        <p:nvSpPr>
-          <p:cNvPr id="7" name="Date Placeholder 6">
-            <a:extLst>
-              <a:ext uri="{FF2B5EF4-FFF2-40B4-BE49-F238E27FC236}">
-                <a16:creationId xmlns:a16="http://schemas.microsoft.com/office/drawing/2014/main" id="{2A37E713-1A8B-A182-4231-D95633BB8D62}"/>
-              </a:ext>
-            </a:extLst>
-          </p:cNvPr>
+            <a:endParaRPr lang="en-US" dirty="0"/>
+          </a:p>
+        </p:txBody>
+      </p:sp>
+      <p:sp>
+        <p:nvSpPr>
+          <p:cNvPr id="7" name="Date Placeholder 6"/>
           <p:cNvSpPr>
             <a:spLocks noGrp="1"/>
           </p:cNvSpPr>
@@ -2253,7 +2047,7 @@
           <a:p>
             <a:fld id="{5DCE9035-4A16-5448-9596-651BFBF89D25}" type="datetimeFigureOut">
               <a:rPr lang="en-US" smtClean="0"/>
-              <a:t>11/1/22</a:t>
+              <a:t>11/2/2022</a:t>
             </a:fld>
             <a:endParaRPr lang="en-US"/>
           </a:p>
@@ -2261,13 +2055,7 @@
       </p:sp>
       <p:sp>
         <p:nvSpPr>
-          <p:cNvPr id="8" name="Footer Placeholder 7">
-            <a:extLst>
-              <a:ext uri="{FF2B5EF4-FFF2-40B4-BE49-F238E27FC236}">
-                <a16:creationId xmlns:a16="http://schemas.microsoft.com/office/drawing/2014/main" id="{E479F9BD-6518-02C2-52F5-FE3ADA7ADDD8}"/>
-              </a:ext>
-            </a:extLst>
-          </p:cNvPr>
+          <p:cNvPr id="8" name="Footer Placeholder 7"/>
           <p:cNvSpPr>
             <a:spLocks noGrp="1"/>
           </p:cNvSpPr>
@@ -2286,13 +2074,7 @@
       </p:sp>
       <p:sp>
         <p:nvSpPr>
-          <p:cNvPr id="9" name="Slide Number Placeholder 8">
-            <a:extLst>
-              <a:ext uri="{FF2B5EF4-FFF2-40B4-BE49-F238E27FC236}">
-                <a16:creationId xmlns:a16="http://schemas.microsoft.com/office/drawing/2014/main" id="{A979FBCA-3BC2-9876-B9CB-5F5A45B4A0C3}"/>
-              </a:ext>
-            </a:extLst>
-          </p:cNvPr>
+          <p:cNvPr id="9" name="Slide Number Placeholder 8"/>
           <p:cNvSpPr>
             <a:spLocks noGrp="1"/>
           </p:cNvSpPr>
@@ -2316,7 +2098,7 @@
     </p:spTree>
     <p:extLst>
       <p:ext uri="{BB962C8B-B14F-4D97-AF65-F5344CB8AC3E}">
-        <p14:creationId xmlns:p14="http://schemas.microsoft.com/office/powerpoint/2010/main" val="4250028339"/>
+        <p14:creationId xmlns:p14="http://schemas.microsoft.com/office/powerpoint/2010/main" val="1995981021"/>
       </p:ext>
     </p:extLst>
   </p:cSld>
@@ -2345,13 +2127,7 @@
       </p:grpSpPr>
       <p:sp>
         <p:nvSpPr>
-          <p:cNvPr id="2" name="Title 1">
-            <a:extLst>
-              <a:ext uri="{FF2B5EF4-FFF2-40B4-BE49-F238E27FC236}">
-                <a16:creationId xmlns:a16="http://schemas.microsoft.com/office/drawing/2014/main" id="{E2CA9DC0-1881-6C1C-6F1A-5A70B0A1290E}"/>
-              </a:ext>
-            </a:extLst>
-          </p:cNvPr>
+          <p:cNvPr id="2" name="Title 1"/>
           <p:cNvSpPr>
             <a:spLocks noGrp="1"/>
           </p:cNvSpPr>
@@ -2368,18 +2144,13 @@
               <a:rPr lang="en-US"/>
               <a:t>Click to edit Master title style</a:t>
             </a:r>
-          </a:p>
-        </p:txBody>
-      </p:sp>
-      <p:sp>
-        <p:nvSpPr>
-          <p:cNvPr id="3" name="Date Placeholder 2">
-            <a:extLst>
-              <a:ext uri="{FF2B5EF4-FFF2-40B4-BE49-F238E27FC236}">
-                <a16:creationId xmlns:a16="http://schemas.microsoft.com/office/drawing/2014/main" id="{06F0F37B-39D1-6619-5214-213DE272FAAA}"/>
-              </a:ext>
-            </a:extLst>
-          </p:cNvPr>
+            <a:endParaRPr lang="en-US" dirty="0"/>
+          </a:p>
+        </p:txBody>
+      </p:sp>
+      <p:sp>
+        <p:nvSpPr>
+          <p:cNvPr id="3" name="Date Placeholder 2"/>
           <p:cNvSpPr>
             <a:spLocks noGrp="1"/>
           </p:cNvSpPr>
@@ -2394,7 +2165,7 @@
           <a:p>
             <a:fld id="{5DCE9035-4A16-5448-9596-651BFBF89D25}" type="datetimeFigureOut">
               <a:rPr lang="en-US" smtClean="0"/>
-              <a:t>11/1/22</a:t>
+              <a:t>11/2/2022</a:t>
             </a:fld>
             <a:endParaRPr lang="en-US"/>
           </a:p>
@@ -2402,13 +2173,7 @@
       </p:sp>
       <p:sp>
         <p:nvSpPr>
-          <p:cNvPr id="4" name="Footer Placeholder 3">
-            <a:extLst>
-              <a:ext uri="{FF2B5EF4-FFF2-40B4-BE49-F238E27FC236}">
-                <a16:creationId xmlns:a16="http://schemas.microsoft.com/office/drawing/2014/main" id="{3FC2C2DE-03B7-D67C-C337-085B64F29CF1}"/>
-              </a:ext>
-            </a:extLst>
-          </p:cNvPr>
+          <p:cNvPr id="4" name="Footer Placeholder 3"/>
           <p:cNvSpPr>
             <a:spLocks noGrp="1"/>
           </p:cNvSpPr>
@@ -2427,13 +2192,7 @@
       </p:sp>
       <p:sp>
         <p:nvSpPr>
-          <p:cNvPr id="5" name="Slide Number Placeholder 4">
-            <a:extLst>
-              <a:ext uri="{FF2B5EF4-FFF2-40B4-BE49-F238E27FC236}">
-                <a16:creationId xmlns:a16="http://schemas.microsoft.com/office/drawing/2014/main" id="{5B6769B2-BE98-E32D-A5B9-7225712069BA}"/>
-              </a:ext>
-            </a:extLst>
-          </p:cNvPr>
+          <p:cNvPr id="5" name="Slide Number Placeholder 4"/>
           <p:cNvSpPr>
             <a:spLocks noGrp="1"/>
           </p:cNvSpPr>
@@ -2457,7 +2216,7 @@
     </p:spTree>
     <p:extLst>
       <p:ext uri="{BB962C8B-B14F-4D97-AF65-F5344CB8AC3E}">
-        <p14:creationId xmlns:p14="http://schemas.microsoft.com/office/powerpoint/2010/main" val="2059074101"/>
+        <p14:creationId xmlns:p14="http://schemas.microsoft.com/office/powerpoint/2010/main" val="448741129"/>
       </p:ext>
     </p:extLst>
   </p:cSld>
@@ -2486,13 +2245,7 @@
       </p:grpSpPr>
       <p:sp>
         <p:nvSpPr>
-          <p:cNvPr id="2" name="Date Placeholder 1">
-            <a:extLst>
-              <a:ext uri="{FF2B5EF4-FFF2-40B4-BE49-F238E27FC236}">
-                <a16:creationId xmlns:a16="http://schemas.microsoft.com/office/drawing/2014/main" id="{3D9248DC-7AF1-27B1-259A-6456123FF8EC}"/>
-              </a:ext>
-            </a:extLst>
-          </p:cNvPr>
+          <p:cNvPr id="2" name="Date Placeholder 1"/>
           <p:cNvSpPr>
             <a:spLocks noGrp="1"/>
           </p:cNvSpPr>
@@ -2507,7 +2260,7 @@
           <a:p>
             <a:fld id="{5DCE9035-4A16-5448-9596-651BFBF89D25}" type="datetimeFigureOut">
               <a:rPr lang="en-US" smtClean="0"/>
-              <a:t>11/1/22</a:t>
+              <a:t>11/2/2022</a:t>
             </a:fld>
             <a:endParaRPr lang="en-US"/>
           </a:p>
@@ -2515,13 +2268,7 @@
       </p:sp>
       <p:sp>
         <p:nvSpPr>
-          <p:cNvPr id="3" name="Footer Placeholder 2">
-            <a:extLst>
-              <a:ext uri="{FF2B5EF4-FFF2-40B4-BE49-F238E27FC236}">
-                <a16:creationId xmlns:a16="http://schemas.microsoft.com/office/drawing/2014/main" id="{8AB6C50A-5EC2-04FC-C7DE-B44BDE7AB9CC}"/>
-              </a:ext>
-            </a:extLst>
-          </p:cNvPr>
+          <p:cNvPr id="3" name="Footer Placeholder 2"/>
           <p:cNvSpPr>
             <a:spLocks noGrp="1"/>
           </p:cNvSpPr>
@@ -2540,13 +2287,7 @@
       </p:sp>
       <p:sp>
         <p:nvSpPr>
-          <p:cNvPr id="4" name="Slide Number Placeholder 3">
-            <a:extLst>
-              <a:ext uri="{FF2B5EF4-FFF2-40B4-BE49-F238E27FC236}">
-                <a16:creationId xmlns:a16="http://schemas.microsoft.com/office/drawing/2014/main" id="{E7BE96DF-F020-D78A-5B84-351841E0B7C6}"/>
-              </a:ext>
-            </a:extLst>
-          </p:cNvPr>
+          <p:cNvPr id="4" name="Slide Number Placeholder 3"/>
           <p:cNvSpPr>
             <a:spLocks noGrp="1"/>
           </p:cNvSpPr>
@@ -2570,7 +2311,7 @@
     </p:spTree>
     <p:extLst>
       <p:ext uri="{BB962C8B-B14F-4D97-AF65-F5344CB8AC3E}">
-        <p14:creationId xmlns:p14="http://schemas.microsoft.com/office/powerpoint/2010/main" val="412972121"/>
+        <p14:creationId xmlns:p14="http://schemas.microsoft.com/office/powerpoint/2010/main" val="1988374269"/>
       </p:ext>
     </p:extLst>
   </p:cSld>
@@ -2599,13 +2340,7 @@
       </p:grpSpPr>
       <p:sp>
         <p:nvSpPr>
-          <p:cNvPr id="2" name="Title 1">
-            <a:extLst>
-              <a:ext uri="{FF2B5EF4-FFF2-40B4-BE49-F238E27FC236}">
-                <a16:creationId xmlns:a16="http://schemas.microsoft.com/office/drawing/2014/main" id="{2C840344-911C-594B-023C-B8207049AD43}"/>
-              </a:ext>
-            </a:extLst>
-          </p:cNvPr>
+          <p:cNvPr id="2" name="Title 1"/>
           <p:cNvSpPr>
             <a:spLocks noGrp="1"/>
           </p:cNvSpPr>
@@ -2631,18 +2366,13 @@
               <a:rPr lang="en-US"/>
               <a:t>Click to edit Master title style</a:t>
             </a:r>
-          </a:p>
-        </p:txBody>
-      </p:sp>
-      <p:sp>
-        <p:nvSpPr>
-          <p:cNvPr id="3" name="Content Placeholder 2">
-            <a:extLst>
-              <a:ext uri="{FF2B5EF4-FFF2-40B4-BE49-F238E27FC236}">
-                <a16:creationId xmlns:a16="http://schemas.microsoft.com/office/drawing/2014/main" id="{27F5C0DA-E528-4B43-D325-7868DC30FE22}"/>
-              </a:ext>
-            </a:extLst>
-          </p:cNvPr>
+            <a:endParaRPr lang="en-US" dirty="0"/>
+          </a:p>
+        </p:txBody>
+      </p:sp>
+      <p:sp>
+        <p:nvSpPr>
+          <p:cNvPr id="3" name="Content Placeholder 2"/>
           <p:cNvSpPr>
             <a:spLocks noGrp="1"/>
           </p:cNvSpPr>
@@ -2721,18 +2451,13 @@
               <a:rPr lang="en-US"/>
               <a:t>Fifth level</a:t>
             </a:r>
-          </a:p>
-        </p:txBody>
-      </p:sp>
-      <p:sp>
-        <p:nvSpPr>
-          <p:cNvPr id="4" name="Text Placeholder 3">
-            <a:extLst>
-              <a:ext uri="{FF2B5EF4-FFF2-40B4-BE49-F238E27FC236}">
-                <a16:creationId xmlns:a16="http://schemas.microsoft.com/office/drawing/2014/main" id="{E78832AE-6DE1-A8C4-B661-6BF567344934}"/>
-              </a:ext>
-            </a:extLst>
-          </p:cNvPr>
+            <a:endParaRPr lang="en-US" dirty="0"/>
+          </a:p>
+        </p:txBody>
+      </p:sp>
+      <p:sp>
+        <p:nvSpPr>
+          <p:cNvPr id="4" name="Text Placeholder 3"/>
           <p:cNvSpPr>
             <a:spLocks noGrp="1"/>
           </p:cNvSpPr>
@@ -2797,13 +2522,7 @@
       </p:sp>
       <p:sp>
         <p:nvSpPr>
-          <p:cNvPr id="5" name="Date Placeholder 4">
-            <a:extLst>
-              <a:ext uri="{FF2B5EF4-FFF2-40B4-BE49-F238E27FC236}">
-                <a16:creationId xmlns:a16="http://schemas.microsoft.com/office/drawing/2014/main" id="{F9EBB286-9284-47CA-B14B-34AC84DA0A4E}"/>
-              </a:ext>
-            </a:extLst>
-          </p:cNvPr>
+          <p:cNvPr id="5" name="Date Placeholder 4"/>
           <p:cNvSpPr>
             <a:spLocks noGrp="1"/>
           </p:cNvSpPr>
@@ -2818,7 +2537,7 @@
           <a:p>
             <a:fld id="{5DCE9035-4A16-5448-9596-651BFBF89D25}" type="datetimeFigureOut">
               <a:rPr lang="en-US" smtClean="0"/>
-              <a:t>11/1/22</a:t>
+              <a:t>11/2/2022</a:t>
             </a:fld>
             <a:endParaRPr lang="en-US"/>
           </a:p>
@@ -2826,13 +2545,7 @@
       </p:sp>
       <p:sp>
         <p:nvSpPr>
-          <p:cNvPr id="6" name="Footer Placeholder 5">
-            <a:extLst>
-              <a:ext uri="{FF2B5EF4-FFF2-40B4-BE49-F238E27FC236}">
-                <a16:creationId xmlns:a16="http://schemas.microsoft.com/office/drawing/2014/main" id="{99119BB2-BCEE-178B-EE7E-F935741FA54F}"/>
-              </a:ext>
-            </a:extLst>
-          </p:cNvPr>
+          <p:cNvPr id="6" name="Footer Placeholder 5"/>
           <p:cNvSpPr>
             <a:spLocks noGrp="1"/>
           </p:cNvSpPr>
@@ -2851,13 +2564,7 @@
       </p:sp>
       <p:sp>
         <p:nvSpPr>
-          <p:cNvPr id="7" name="Slide Number Placeholder 6">
-            <a:extLst>
-              <a:ext uri="{FF2B5EF4-FFF2-40B4-BE49-F238E27FC236}">
-                <a16:creationId xmlns:a16="http://schemas.microsoft.com/office/drawing/2014/main" id="{F226D89C-25EB-38A2-D4F9-5506B9155CC6}"/>
-              </a:ext>
-            </a:extLst>
-          </p:cNvPr>
+          <p:cNvPr id="7" name="Slide Number Placeholder 6"/>
           <p:cNvSpPr>
             <a:spLocks noGrp="1"/>
           </p:cNvSpPr>
@@ -2881,7 +2588,7 @@
     </p:spTree>
     <p:extLst>
       <p:ext uri="{BB962C8B-B14F-4D97-AF65-F5344CB8AC3E}">
-        <p14:creationId xmlns:p14="http://schemas.microsoft.com/office/powerpoint/2010/main" val="1852472907"/>
+        <p14:creationId xmlns:p14="http://schemas.microsoft.com/office/powerpoint/2010/main" val="606415704"/>
       </p:ext>
     </p:extLst>
   </p:cSld>
@@ -2910,13 +2617,7 @@
       </p:grpSpPr>
       <p:sp>
         <p:nvSpPr>
-          <p:cNvPr id="2" name="Title 1">
-            <a:extLst>
-              <a:ext uri="{FF2B5EF4-FFF2-40B4-BE49-F238E27FC236}">
-                <a16:creationId xmlns:a16="http://schemas.microsoft.com/office/drawing/2014/main" id="{81E05AA4-A723-4FFE-C3B3-0A784CD3527B}"/>
-              </a:ext>
-            </a:extLst>
-          </p:cNvPr>
+          <p:cNvPr id="2" name="Title 1"/>
           <p:cNvSpPr>
             <a:spLocks noGrp="1"/>
           </p:cNvSpPr>
@@ -2942,20 +2643,15 @@
               <a:rPr lang="en-US"/>
               <a:t>Click to edit Master title style</a:t>
             </a:r>
-          </a:p>
-        </p:txBody>
-      </p:sp>
-      <p:sp>
-        <p:nvSpPr>
-          <p:cNvPr id="3" name="Picture Placeholder 2">
-            <a:extLst>
-              <a:ext uri="{FF2B5EF4-FFF2-40B4-BE49-F238E27FC236}">
-                <a16:creationId xmlns:a16="http://schemas.microsoft.com/office/drawing/2014/main" id="{D5BD479F-552C-1F12-F8F4-86028D0F2C4C}"/>
-              </a:ext>
-            </a:extLst>
-          </p:cNvPr>
-          <p:cNvSpPr>
-            <a:spLocks noGrp="1"/>
+            <a:endParaRPr lang="en-US" dirty="0"/>
+          </a:p>
+        </p:txBody>
+      </p:sp>
+      <p:sp>
+        <p:nvSpPr>
+          <p:cNvPr id="3" name="Picture Placeholder 2"/>
+          <p:cNvSpPr>
+            <a:spLocks noGrp="1" noChangeAspect="1"/>
           </p:cNvSpPr>
           <p:nvPr>
             <p:ph type="pic" idx="1"/>
@@ -2968,7 +2664,7 @@
           </a:xfrm>
         </p:spPr>
         <p:txBody>
-          <a:bodyPr/>
+          <a:bodyPr anchor="t"/>
           <a:lstStyle>
             <a:lvl1pPr marL="0" indent="0">
               <a:buNone/>
@@ -3008,19 +2704,17 @@
             </a:lvl9pPr>
           </a:lstStyle>
           <a:p>
-            <a:endParaRPr lang="en-US"/>
-          </a:p>
-        </p:txBody>
-      </p:sp>
-      <p:sp>
-        <p:nvSpPr>
-          <p:cNvPr id="4" name="Text Placeholder 3">
-            <a:extLst>
-              <a:ext uri="{FF2B5EF4-FFF2-40B4-BE49-F238E27FC236}">
-                <a16:creationId xmlns:a16="http://schemas.microsoft.com/office/drawing/2014/main" id="{281AD6A0-6EC9-E929-2FD4-CADA4471385A}"/>
-              </a:ext>
-            </a:extLst>
-          </p:cNvPr>
+            <a:r>
+              <a:rPr lang="en-US"/>
+              <a:t>Click icon to add picture</a:t>
+            </a:r>
+            <a:endParaRPr lang="en-US" dirty="0"/>
+          </a:p>
+        </p:txBody>
+      </p:sp>
+      <p:sp>
+        <p:nvSpPr>
+          <p:cNvPr id="4" name="Text Placeholder 3"/>
           <p:cNvSpPr>
             <a:spLocks noGrp="1"/>
           </p:cNvSpPr>
@@ -3085,13 +2779,7 @@
       </p:sp>
       <p:sp>
         <p:nvSpPr>
-          <p:cNvPr id="5" name="Date Placeholder 4">
-            <a:extLst>
-              <a:ext uri="{FF2B5EF4-FFF2-40B4-BE49-F238E27FC236}">
-                <a16:creationId xmlns:a16="http://schemas.microsoft.com/office/drawing/2014/main" id="{D4CC11E4-55CA-A1B9-7B8A-C2566DFA940D}"/>
-              </a:ext>
-            </a:extLst>
-          </p:cNvPr>
+          <p:cNvPr id="5" name="Date Placeholder 4"/>
           <p:cNvSpPr>
             <a:spLocks noGrp="1"/>
           </p:cNvSpPr>
@@ -3106,7 +2794,7 @@
           <a:p>
             <a:fld id="{5DCE9035-4A16-5448-9596-651BFBF89D25}" type="datetimeFigureOut">
               <a:rPr lang="en-US" smtClean="0"/>
-              <a:t>11/1/22</a:t>
+              <a:t>11/2/2022</a:t>
             </a:fld>
             <a:endParaRPr lang="en-US"/>
           </a:p>
@@ -3114,13 +2802,7 @@
       </p:sp>
       <p:sp>
         <p:nvSpPr>
-          <p:cNvPr id="6" name="Footer Placeholder 5">
-            <a:extLst>
-              <a:ext uri="{FF2B5EF4-FFF2-40B4-BE49-F238E27FC236}">
-                <a16:creationId xmlns:a16="http://schemas.microsoft.com/office/drawing/2014/main" id="{BB466E9B-EBAD-4E7C-D1D5-2BD4C9454416}"/>
-              </a:ext>
-            </a:extLst>
-          </p:cNvPr>
+          <p:cNvPr id="6" name="Footer Placeholder 5"/>
           <p:cNvSpPr>
             <a:spLocks noGrp="1"/>
           </p:cNvSpPr>
@@ -3139,13 +2821,7 @@
       </p:sp>
       <p:sp>
         <p:nvSpPr>
-          <p:cNvPr id="7" name="Slide Number Placeholder 6">
-            <a:extLst>
-              <a:ext uri="{FF2B5EF4-FFF2-40B4-BE49-F238E27FC236}">
-                <a16:creationId xmlns:a16="http://schemas.microsoft.com/office/drawing/2014/main" id="{6DE14FA2-BCC7-35B8-2736-C9B060FF355D}"/>
-              </a:ext>
-            </a:extLst>
-          </p:cNvPr>
+          <p:cNvPr id="7" name="Slide Number Placeholder 6"/>
           <p:cNvSpPr>
             <a:spLocks noGrp="1"/>
           </p:cNvSpPr>
@@ -3169,7 +2845,7 @@
     </p:spTree>
     <p:extLst>
       <p:ext uri="{BB962C8B-B14F-4D97-AF65-F5344CB8AC3E}">
-        <p14:creationId xmlns:p14="http://schemas.microsoft.com/office/powerpoint/2010/main" val="4249167022"/>
+        <p14:creationId xmlns:p14="http://schemas.microsoft.com/office/powerpoint/2010/main" val="4148469434"/>
       </p:ext>
     </p:extLst>
   </p:cSld>
@@ -3203,13 +2879,7 @@
       </p:grpSpPr>
       <p:sp>
         <p:nvSpPr>
-          <p:cNvPr id="2" name="Title Placeholder 1">
-            <a:extLst>
-              <a:ext uri="{FF2B5EF4-FFF2-40B4-BE49-F238E27FC236}">
-                <a16:creationId xmlns:a16="http://schemas.microsoft.com/office/drawing/2014/main" id="{4EBCC615-49FF-29C4-1C8E-3EC20F181BB4}"/>
-              </a:ext>
-            </a:extLst>
-          </p:cNvPr>
+          <p:cNvPr id="2" name="Title Placeholder 1"/>
           <p:cNvSpPr>
             <a:spLocks noGrp="1"/>
           </p:cNvSpPr>
@@ -3236,18 +2906,13 @@
               <a:rPr lang="en-US"/>
               <a:t>Click to edit Master title style</a:t>
             </a:r>
-          </a:p>
-        </p:txBody>
-      </p:sp>
-      <p:sp>
-        <p:nvSpPr>
-          <p:cNvPr id="3" name="Text Placeholder 2">
-            <a:extLst>
-              <a:ext uri="{FF2B5EF4-FFF2-40B4-BE49-F238E27FC236}">
-                <a16:creationId xmlns:a16="http://schemas.microsoft.com/office/drawing/2014/main" id="{287F0EC1-3FF1-1CFF-FB6C-A1F91669AF08}"/>
-              </a:ext>
-            </a:extLst>
-          </p:cNvPr>
+            <a:endParaRPr lang="en-US" dirty="0"/>
+          </a:p>
+        </p:txBody>
+      </p:sp>
+      <p:sp>
+        <p:nvSpPr>
+          <p:cNvPr id="3" name="Text Placeholder 2"/>
           <p:cNvSpPr>
             <a:spLocks noGrp="1"/>
           </p:cNvSpPr>
@@ -3303,18 +2968,13 @@
               <a:rPr lang="en-US"/>
               <a:t>Fifth level</a:t>
             </a:r>
-          </a:p>
-        </p:txBody>
-      </p:sp>
-      <p:sp>
-        <p:nvSpPr>
-          <p:cNvPr id="4" name="Date Placeholder 3">
-            <a:extLst>
-              <a:ext uri="{FF2B5EF4-FFF2-40B4-BE49-F238E27FC236}">
-                <a16:creationId xmlns:a16="http://schemas.microsoft.com/office/drawing/2014/main" id="{DC3F873C-1F7B-B074-2554-ED3E9175C290}"/>
-              </a:ext>
-            </a:extLst>
-          </p:cNvPr>
+            <a:endParaRPr lang="en-US" dirty="0"/>
+          </a:p>
+        </p:txBody>
+      </p:sp>
+      <p:sp>
+        <p:nvSpPr>
+          <p:cNvPr id="4" name="Date Placeholder 3"/>
           <p:cNvSpPr>
             <a:spLocks noGrp="1"/>
           </p:cNvSpPr>
@@ -3347,7 +3007,7 @@
           <a:p>
             <a:fld id="{5DCE9035-4A16-5448-9596-651BFBF89D25}" type="datetimeFigureOut">
               <a:rPr lang="en-US" smtClean="0"/>
-              <a:t>11/1/22</a:t>
+              <a:t>11/2/2022</a:t>
             </a:fld>
             <a:endParaRPr lang="en-US"/>
           </a:p>
@@ -3355,13 +3015,7 @@
       </p:sp>
       <p:sp>
         <p:nvSpPr>
-          <p:cNvPr id="5" name="Footer Placeholder 4">
-            <a:extLst>
-              <a:ext uri="{FF2B5EF4-FFF2-40B4-BE49-F238E27FC236}">
-                <a16:creationId xmlns:a16="http://schemas.microsoft.com/office/drawing/2014/main" id="{5BB5EAD8-C22A-D366-B997-7B382FF5F4CB}"/>
-              </a:ext>
-            </a:extLst>
-          </p:cNvPr>
+          <p:cNvPr id="5" name="Footer Placeholder 4"/>
           <p:cNvSpPr>
             <a:spLocks noGrp="1"/>
           </p:cNvSpPr>
@@ -3398,13 +3052,7 @@
       </p:sp>
       <p:sp>
         <p:nvSpPr>
-          <p:cNvPr id="6" name="Slide Number Placeholder 5">
-            <a:extLst>
-              <a:ext uri="{FF2B5EF4-FFF2-40B4-BE49-F238E27FC236}">
-                <a16:creationId xmlns:a16="http://schemas.microsoft.com/office/drawing/2014/main" id="{F0E06E00-267E-796D-376A-AF9CF57DAE04}"/>
-              </a:ext>
-            </a:extLst>
-          </p:cNvPr>
+          <p:cNvPr id="6" name="Slide Number Placeholder 5"/>
           <p:cNvSpPr>
             <a:spLocks noGrp="1"/>
           </p:cNvSpPr>
@@ -3446,23 +3094,23 @@
     </p:spTree>
     <p:extLst>
       <p:ext uri="{BB962C8B-B14F-4D97-AF65-F5344CB8AC3E}">
-        <p14:creationId xmlns:p14="http://schemas.microsoft.com/office/powerpoint/2010/main" val="1380627147"/>
+        <p14:creationId xmlns:p14="http://schemas.microsoft.com/office/powerpoint/2010/main" val="2030733432"/>
       </p:ext>
     </p:extLst>
   </p:cSld>
   <p:clrMap bg1="lt1" tx1="dk1" bg2="lt2" tx2="dk2" accent1="accent1" accent2="accent2" accent3="accent3" accent4="accent4" accent5="accent5" accent6="accent6" hlink="hlink" folHlink="folHlink"/>
   <p:sldLayoutIdLst>
-    <p:sldLayoutId id="2147483649" r:id="rId1"/>
-    <p:sldLayoutId id="2147483650" r:id="rId2"/>
-    <p:sldLayoutId id="2147483651" r:id="rId3"/>
-    <p:sldLayoutId id="2147483652" r:id="rId4"/>
-    <p:sldLayoutId id="2147483653" r:id="rId5"/>
-    <p:sldLayoutId id="2147483654" r:id="rId6"/>
-    <p:sldLayoutId id="2147483655" r:id="rId7"/>
-    <p:sldLayoutId id="2147483656" r:id="rId8"/>
-    <p:sldLayoutId id="2147483657" r:id="rId9"/>
-    <p:sldLayoutId id="2147483658" r:id="rId10"/>
-    <p:sldLayoutId id="2147483659" r:id="rId11"/>
+    <p:sldLayoutId id="2147483661" r:id="rId1"/>
+    <p:sldLayoutId id="2147483662" r:id="rId2"/>
+    <p:sldLayoutId id="2147483663" r:id="rId3"/>
+    <p:sldLayoutId id="2147483664" r:id="rId4"/>
+    <p:sldLayoutId id="2147483665" r:id="rId5"/>
+    <p:sldLayoutId id="2147483666" r:id="rId6"/>
+    <p:sldLayoutId id="2147483667" r:id="rId7"/>
+    <p:sldLayoutId id="2147483668" r:id="rId8"/>
+    <p:sldLayoutId id="2147483669" r:id="rId9"/>
+    <p:sldLayoutId id="2147483670" r:id="rId10"/>
+    <p:sldLayoutId id="2147483671" r:id="rId11"/>
   </p:sldLayoutIdLst>
   <p:txStyles>
     <p:titleStyle>
@@ -4914,6 +4562,14 @@
 <file path=ppt/slides/slide3.xml><?xml version="1.0" encoding="utf-8"?>
 <p:sld xmlns:a="http://schemas.openxmlformats.org/drawingml/2006/main" xmlns:r="http://schemas.openxmlformats.org/officeDocument/2006/relationships" xmlns:p="http://schemas.openxmlformats.org/presentationml/2006/main">
   <p:cSld>
+    <p:bg>
+      <p:bgPr>
+        <a:solidFill>
+          <a:srgbClr val="1F4E79"/>
+        </a:solidFill>
+        <a:effectLst/>
+      </p:bgPr>
+    </p:bg>
     <p:spTree>
       <p:nvGrpSpPr>
         <p:cNvPr id="1" name=""/>
@@ -4995,12 +4651,7 @@
             <p:ph type="title"/>
           </p:nvPr>
         </p:nvSpPr>
-        <p:spPr>
-          <a:xfrm>
-            <a:off x="838200" y="365125"/>
-            <a:ext cx="10515600" cy="1325563"/>
-          </a:xfrm>
-        </p:spPr>
+        <p:spPr/>
         <p:txBody>
           <a:bodyPr/>
           <a:lstStyle/>
@@ -5506,10 +5157,199 @@
 </p:sld>
 </file>
 
+<file path=ppt/slides/slide4.xml><?xml version="1.0" encoding="utf-8"?>
+<p:sld xmlns:a="http://schemas.openxmlformats.org/drawingml/2006/main" xmlns:r="http://schemas.openxmlformats.org/officeDocument/2006/relationships" xmlns:p="http://schemas.openxmlformats.org/presentationml/2006/main">
+  <p:cSld>
+    <p:bg>
+      <p:bgPr>
+        <a:solidFill>
+          <a:srgbClr val="1F4E79"/>
+        </a:solidFill>
+        <a:effectLst/>
+      </p:bgPr>
+    </p:bg>
+    <p:spTree>
+      <p:nvGrpSpPr>
+        <p:cNvPr id="1" name=""/>
+        <p:cNvGrpSpPr/>
+        <p:nvPr/>
+      </p:nvGrpSpPr>
+      <p:grpSpPr>
+        <a:xfrm>
+          <a:off x="0" y="0"/>
+          <a:ext cx="0" cy="0"/>
+          <a:chOff x="0" y="0"/>
+          <a:chExt cx="0" cy="0"/>
+        </a:xfrm>
+      </p:grpSpPr>
+      <p:sp>
+        <p:nvSpPr>
+          <p:cNvPr id="4" name="Title 3">
+            <a:extLst>
+              <a:ext uri="{FF2B5EF4-FFF2-40B4-BE49-F238E27FC236}">
+                <a16:creationId xmlns:a16="http://schemas.microsoft.com/office/drawing/2014/main" id="{34BB7737-EC04-5F55-11BD-E78EE10FC2A4}"/>
+              </a:ext>
+            </a:extLst>
+          </p:cNvPr>
+          <p:cNvSpPr>
+            <a:spLocks noGrp="1"/>
+          </p:cNvSpPr>
+          <p:nvPr>
+            <p:ph type="title"/>
+          </p:nvPr>
+        </p:nvSpPr>
+        <p:spPr>
+          <a:xfrm>
+            <a:off x="741768" y="0"/>
+            <a:ext cx="10515600" cy="1325563"/>
+          </a:xfrm>
+        </p:spPr>
+        <p:txBody>
+          <a:bodyPr/>
+          <a:lstStyle/>
+          <a:p>
+            <a:r>
+              <a:rPr lang="en-US" dirty="0">
+                <a:solidFill>
+                  <a:schemeClr val="bg1"/>
+                </a:solidFill>
+              </a:rPr>
+              <a:t>Reshaping Our Data for the SMART Q</a:t>
+            </a:r>
+          </a:p>
+        </p:txBody>
+      </p:sp>
+      <p:sp>
+        <p:nvSpPr>
+          <p:cNvPr id="8" name="TextBox 7">
+            <a:extLst>
+              <a:ext uri="{FF2B5EF4-FFF2-40B4-BE49-F238E27FC236}">
+                <a16:creationId xmlns:a16="http://schemas.microsoft.com/office/drawing/2014/main" id="{BA1C2B61-1451-DF3E-BC3E-45C9C4864253}"/>
+              </a:ext>
+            </a:extLst>
+          </p:cNvPr>
+          <p:cNvSpPr txBox="1"/>
+          <p:nvPr/>
+        </p:nvSpPr>
+        <p:spPr>
+          <a:xfrm>
+            <a:off x="117231" y="1749681"/>
+            <a:ext cx="3810000" cy="3970318"/>
+          </a:xfrm>
+          <a:prstGeom prst="rect">
+            <a:avLst/>
+          </a:prstGeom>
+          <a:solidFill>
+            <a:srgbClr val="C00000"/>
+          </a:solidFill>
+          <a:ln>
+            <a:solidFill>
+              <a:schemeClr val="bg1"/>
+            </a:solidFill>
+          </a:ln>
+          <a:effectLst>
+            <a:glow rad="63500">
+              <a:schemeClr val="accent3">
+                <a:satMod val="175000"/>
+                <a:alpha val="40000"/>
+              </a:schemeClr>
+            </a:glow>
+          </a:effectLst>
+        </p:spPr>
+        <p:txBody>
+          <a:bodyPr wrap="square" rtlCol="0">
+            <a:spAutoFit/>
+          </a:bodyPr>
+          <a:lstStyle/>
+          <a:p>
+            <a:pPr marL="342900" indent="-342900">
+              <a:buAutoNum type="arabicPeriod"/>
+            </a:pPr>
+            <a:r>
+              <a:rPr lang="en-US" sz="2800" dirty="0">
+                <a:solidFill>
+                  <a:schemeClr val="bg1"/>
+                </a:solidFill>
+              </a:rPr>
+              <a:t>Group Data and Variables by State to foster comparisons at the State level</a:t>
+            </a:r>
+          </a:p>
+          <a:p>
+            <a:pPr marL="342900" indent="-342900">
+              <a:buAutoNum type="arabicPeriod"/>
+            </a:pPr>
+            <a:endParaRPr lang="en-US" sz="2800" dirty="0">
+              <a:solidFill>
+                <a:schemeClr val="bg1"/>
+              </a:solidFill>
+            </a:endParaRPr>
+          </a:p>
+          <a:p>
+            <a:pPr marL="342900" indent="-342900">
+              <a:buAutoNum type="arabicPeriod"/>
+            </a:pPr>
+            <a:r>
+              <a:rPr lang="en-US" sz="2800" dirty="0">
+                <a:solidFill>
+                  <a:schemeClr val="bg1"/>
+                </a:solidFill>
+              </a:rPr>
+              <a:t>Separated the Data into Regions for Graphical Display Purposes</a:t>
+            </a:r>
+          </a:p>
+        </p:txBody>
+      </p:sp>
+      <p:pic>
+        <p:nvPicPr>
+          <p:cNvPr id="10" name="Picture 9" descr="Map&#10;&#10;Description automatically generated">
+            <a:extLst>
+              <a:ext uri="{FF2B5EF4-FFF2-40B4-BE49-F238E27FC236}">
+                <a16:creationId xmlns:a16="http://schemas.microsoft.com/office/drawing/2014/main" id="{BB0CA4E1-B19F-C6F9-FAC0-67F2621A1916}"/>
+              </a:ext>
+            </a:extLst>
+          </p:cNvPr>
+          <p:cNvPicPr>
+            <a:picLocks noChangeAspect="1"/>
+          </p:cNvPicPr>
+          <p:nvPr/>
+        </p:nvPicPr>
+        <p:blipFill rotWithShape="1">
+          <a:blip r:embed="rId2"/>
+          <a:srcRect b="14514"/>
+          <a:stretch/>
+        </p:blipFill>
+        <p:spPr>
+          <a:xfrm>
+            <a:off x="4434023" y="1645668"/>
+            <a:ext cx="7371115" cy="4074331"/>
+          </a:xfrm>
+          <a:prstGeom prst="rect">
+            <a:avLst/>
+          </a:prstGeom>
+          <a:ln>
+            <a:solidFill>
+              <a:srgbClr val="C00000"/>
+            </a:solidFill>
+          </a:ln>
+        </p:spPr>
+      </p:pic>
+    </p:spTree>
+    <p:extLst>
+      <p:ext uri="{BB962C8B-B14F-4D97-AF65-F5344CB8AC3E}">
+        <p14:creationId xmlns:p14="http://schemas.microsoft.com/office/powerpoint/2010/main" val="974841345"/>
+      </p:ext>
+    </p:extLst>
+  </p:cSld>
+  <p:clrMapOvr>
+    <a:masterClrMapping/>
+  </p:clrMapOvr>
+</p:sld>
+</file>
+
 <file path=ppt/theme/theme1.xml><?xml version="1.0" encoding="utf-8"?>
 <a:theme xmlns:a="http://schemas.openxmlformats.org/drawingml/2006/main" name="Office Theme">
   <a:themeElements>
-    <a:clrScheme name="Office">
+    <a:clrScheme name="Office Theme">
       <a:dk1>
         <a:sysClr val="windowText" lastClr="000000"/>
       </a:dk1>
@@ -5547,7 +5387,7 @@
         <a:srgbClr val="954F72"/>
       </a:folHlink>
     </a:clrScheme>
-    <a:fontScheme name="Office">
+    <a:fontScheme name="Office Theme">
       <a:majorFont>
         <a:latin typeface="Calibri Light" panose="020F0302020204030204"/>
         <a:ea typeface=""/>
@@ -5582,23 +5422,6 @@
         <a:font script="Viet" typeface="Times New Roman"/>
         <a:font script="Uigh" typeface="Microsoft Uighur"/>
         <a:font script="Geor" typeface="Sylfaen"/>
-        <a:font script="Armn" typeface="Arial"/>
-        <a:font script="Bugi" typeface="Leelawadee UI"/>
-        <a:font script="Bopo" typeface="Microsoft JhengHei"/>
-        <a:font script="Java" typeface="Javanese Text"/>
-        <a:font script="Lisu" typeface="Segoe UI"/>
-        <a:font script="Mymr" typeface="Myanmar Text"/>
-        <a:font script="Nkoo" typeface="Ebrima"/>
-        <a:font script="Olck" typeface="Nirmala UI"/>
-        <a:font script="Osma" typeface="Ebrima"/>
-        <a:font script="Phag" typeface="Phagspa"/>
-        <a:font script="Syrn" typeface="Estrangelo Edessa"/>
-        <a:font script="Syrj" typeface="Estrangelo Edessa"/>
-        <a:font script="Syre" typeface="Estrangelo Edessa"/>
-        <a:font script="Sora" typeface="Nirmala UI"/>
-        <a:font script="Tale" typeface="Microsoft Tai Le"/>
-        <a:font script="Talu" typeface="Microsoft New Tai Lue"/>
-        <a:font script="Tfng" typeface="Ebrima"/>
       </a:majorFont>
       <a:minorFont>
         <a:latin typeface="Calibri" panose="020F0502020204030204"/>
@@ -5634,26 +5457,9 @@
         <a:font script="Viet" typeface="Arial"/>
         <a:font script="Uigh" typeface="Microsoft Uighur"/>
         <a:font script="Geor" typeface="Sylfaen"/>
-        <a:font script="Armn" typeface="Arial"/>
-        <a:font script="Bugi" typeface="Leelawadee UI"/>
-        <a:font script="Bopo" typeface="Microsoft JhengHei"/>
-        <a:font script="Java" typeface="Javanese Text"/>
-        <a:font script="Lisu" typeface="Segoe UI"/>
-        <a:font script="Mymr" typeface="Myanmar Text"/>
-        <a:font script="Nkoo" typeface="Ebrima"/>
-        <a:font script="Olck" typeface="Nirmala UI"/>
-        <a:font script="Osma" typeface="Ebrima"/>
-        <a:font script="Phag" typeface="Phagspa"/>
-        <a:font script="Syrn" typeface="Estrangelo Edessa"/>
-        <a:font script="Syrj" typeface="Estrangelo Edessa"/>
-        <a:font script="Syre" typeface="Estrangelo Edessa"/>
-        <a:font script="Sora" typeface="Nirmala UI"/>
-        <a:font script="Tale" typeface="Microsoft Tai Le"/>
-        <a:font script="Talu" typeface="Microsoft New Tai Lue"/>
-        <a:font script="Tfng" typeface="Ebrima"/>
       </a:minorFont>
     </a:fontScheme>
-    <a:fmtScheme name="Office">
+    <a:fmtScheme name="Office Theme">
       <a:fillStyleLst>
         <a:solidFill>
           <a:schemeClr val="phClr"/>

</xml_diff>

<commit_message>
Update PPT for Intro to Data Science.pptx
</commit_message>
<xml_diff>
--- a/PPT for Intro to Data Science.pptx
+++ b/PPT for Intro to Data Science.pptx
@@ -5,13 +5,14 @@
     <p:sldMasterId id="2147483660" r:id="rId1"/>
   </p:sldMasterIdLst>
   <p:notesMasterIdLst>
-    <p:notesMasterId r:id="rId6"/>
+    <p:notesMasterId r:id="rId7"/>
   </p:notesMasterIdLst>
   <p:sldIdLst>
     <p:sldId id="256" r:id="rId2"/>
     <p:sldId id="257" r:id="rId3"/>
     <p:sldId id="258" r:id="rId4"/>
-    <p:sldId id="259" r:id="rId5"/>
+    <p:sldId id="260" r:id="rId5"/>
+    <p:sldId id="259" r:id="rId6"/>
   </p:sldIdLst>
   <p:sldSz cx="12192000" cy="6858000"/>
   <p:notesSz cx="6858000" cy="9144000"/>
@@ -5158,6 +5159,89 @@
 </file>
 
 <file path=ppt/slides/slide4.xml><?xml version="1.0" encoding="utf-8"?>
+<p:sld xmlns:a="http://schemas.openxmlformats.org/drawingml/2006/main" xmlns:r="http://schemas.openxmlformats.org/officeDocument/2006/relationships" xmlns:p="http://schemas.openxmlformats.org/presentationml/2006/main">
+  <p:cSld>
+    <p:spTree>
+      <p:nvGrpSpPr>
+        <p:cNvPr id="1" name=""/>
+        <p:cNvGrpSpPr/>
+        <p:nvPr/>
+      </p:nvGrpSpPr>
+      <p:grpSpPr>
+        <a:xfrm>
+          <a:off x="0" y="0"/>
+          <a:ext cx="0" cy="0"/>
+          <a:chOff x="0" y="0"/>
+          <a:chExt cx="0" cy="0"/>
+        </a:xfrm>
+      </p:grpSpPr>
+      <p:sp>
+        <p:nvSpPr>
+          <p:cNvPr id="2" name="Title 1">
+            <a:extLst>
+              <a:ext uri="{FF2B5EF4-FFF2-40B4-BE49-F238E27FC236}">
+                <a16:creationId xmlns:a16="http://schemas.microsoft.com/office/drawing/2014/main" id="{245F18AF-B54D-FF57-1C49-84B9320DF682}"/>
+              </a:ext>
+            </a:extLst>
+          </p:cNvPr>
+          <p:cNvSpPr>
+            <a:spLocks noGrp="1"/>
+          </p:cNvSpPr>
+          <p:nvPr>
+            <p:ph type="title"/>
+          </p:nvPr>
+        </p:nvSpPr>
+        <p:spPr/>
+        <p:txBody>
+          <a:bodyPr/>
+          <a:lstStyle/>
+          <a:p>
+            <a:r>
+              <a:rPr lang="en-US" dirty="0"/>
+              <a:t>RAJEEV START HERE</a:t>
+            </a:r>
+          </a:p>
+        </p:txBody>
+      </p:sp>
+      <p:sp>
+        <p:nvSpPr>
+          <p:cNvPr id="3" name="Content Placeholder 2">
+            <a:extLst>
+              <a:ext uri="{FF2B5EF4-FFF2-40B4-BE49-F238E27FC236}">
+                <a16:creationId xmlns:a16="http://schemas.microsoft.com/office/drawing/2014/main" id="{C2CE18FB-6367-DF80-602C-1DE2EFD2EAF4}"/>
+              </a:ext>
+            </a:extLst>
+          </p:cNvPr>
+          <p:cNvSpPr>
+            <a:spLocks noGrp="1"/>
+          </p:cNvSpPr>
+          <p:nvPr>
+            <p:ph idx="1"/>
+          </p:nvPr>
+        </p:nvSpPr>
+        <p:spPr/>
+        <p:txBody>
+          <a:bodyPr/>
+          <a:lstStyle/>
+          <a:p>
+            <a:endParaRPr lang="en-US"/>
+          </a:p>
+        </p:txBody>
+      </p:sp>
+    </p:spTree>
+    <p:extLst>
+      <p:ext uri="{BB962C8B-B14F-4D97-AF65-F5344CB8AC3E}">
+        <p14:creationId xmlns:p14="http://schemas.microsoft.com/office/powerpoint/2010/main" val="129348094"/>
+      </p:ext>
+    </p:extLst>
+  </p:cSld>
+  <p:clrMapOvr>
+    <a:masterClrMapping/>
+  </p:clrMapOvr>
+</p:sld>
+</file>
+
+<file path=ppt/slides/slide5.xml><?xml version="1.0" encoding="utf-8"?>
 <p:sld xmlns:a="http://schemas.openxmlformats.org/drawingml/2006/main" xmlns:r="http://schemas.openxmlformats.org/officeDocument/2006/relationships" xmlns:p="http://schemas.openxmlformats.org/presentationml/2006/main">
   <p:cSld>
     <p:bg>

</xml_diff>

<commit_message>
Finished my Proportion of the powerpoint and altered Rajeevs final eda
</commit_message>
<xml_diff>
--- a/PPT for Intro to Data Science.pptx
+++ b/PPT for Intro to Data Science.pptx
@@ -5,14 +5,21 @@
     <p:sldMasterId id="2147483660" r:id="rId1"/>
   </p:sldMasterIdLst>
   <p:notesMasterIdLst>
-    <p:notesMasterId r:id="rId7"/>
+    <p:notesMasterId r:id="rId14"/>
   </p:notesMasterIdLst>
   <p:sldIdLst>
     <p:sldId id="256" r:id="rId2"/>
     <p:sldId id="257" r:id="rId3"/>
-    <p:sldId id="258" r:id="rId4"/>
-    <p:sldId id="260" r:id="rId5"/>
+    <p:sldId id="260" r:id="rId4"/>
+    <p:sldId id="258" r:id="rId5"/>
     <p:sldId id="259" r:id="rId6"/>
+    <p:sldId id="261" r:id="rId7"/>
+    <p:sldId id="262" r:id="rId8"/>
+    <p:sldId id="263" r:id="rId9"/>
+    <p:sldId id="265" r:id="rId10"/>
+    <p:sldId id="267" r:id="rId11"/>
+    <p:sldId id="268" r:id="rId12"/>
+    <p:sldId id="269" r:id="rId13"/>
   </p:sldIdLst>
   <p:sldSz cx="12192000" cy="6858000"/>
   <p:notesSz cx="6858000" cy="9144000"/>
@@ -201,7 +208,7 @@
           <a:p>
             <a:fld id="{9F7B77B6-A42E-A048-A74D-7373B9F65E74}" type="datetimeFigureOut">
               <a:rPr lang="en-US" smtClean="0"/>
-              <a:t>11/2/2022</a:t>
+              <a:t>11/3/2022</a:t>
             </a:fld>
             <a:endParaRPr lang="en-US"/>
           </a:p>
@@ -683,7 +690,7 @@
           <a:p>
             <a:fld id="{5DCE9035-4A16-5448-9596-651BFBF89D25}" type="datetimeFigureOut">
               <a:rPr lang="en-US" smtClean="0"/>
-              <a:t>11/2/2022</a:t>
+              <a:t>11/3/2022</a:t>
             </a:fld>
             <a:endParaRPr lang="en-US"/>
           </a:p>
@@ -853,7 +860,7 @@
           <a:p>
             <a:fld id="{5DCE9035-4A16-5448-9596-651BFBF89D25}" type="datetimeFigureOut">
               <a:rPr lang="en-US" smtClean="0"/>
-              <a:t>11/2/2022</a:t>
+              <a:t>11/3/2022</a:t>
             </a:fld>
             <a:endParaRPr lang="en-US"/>
           </a:p>
@@ -1033,7 +1040,7 @@
           <a:p>
             <a:fld id="{5DCE9035-4A16-5448-9596-651BFBF89D25}" type="datetimeFigureOut">
               <a:rPr lang="en-US" smtClean="0"/>
-              <a:t>11/2/2022</a:t>
+              <a:t>11/3/2022</a:t>
             </a:fld>
             <a:endParaRPr lang="en-US"/>
           </a:p>
@@ -1203,7 +1210,7 @@
           <a:p>
             <a:fld id="{5DCE9035-4A16-5448-9596-651BFBF89D25}" type="datetimeFigureOut">
               <a:rPr lang="en-US" smtClean="0"/>
-              <a:t>11/2/2022</a:t>
+              <a:t>11/3/2022</a:t>
             </a:fld>
             <a:endParaRPr lang="en-US"/>
           </a:p>
@@ -1449,7 +1456,7 @@
           <a:p>
             <a:fld id="{5DCE9035-4A16-5448-9596-651BFBF89D25}" type="datetimeFigureOut">
               <a:rPr lang="en-US" smtClean="0"/>
-              <a:t>11/2/2022</a:t>
+              <a:t>11/3/2022</a:t>
             </a:fld>
             <a:endParaRPr lang="en-US"/>
           </a:p>
@@ -1681,7 +1688,7 @@
           <a:p>
             <a:fld id="{5DCE9035-4A16-5448-9596-651BFBF89D25}" type="datetimeFigureOut">
               <a:rPr lang="en-US" smtClean="0"/>
-              <a:t>11/2/2022</a:t>
+              <a:t>11/3/2022</a:t>
             </a:fld>
             <a:endParaRPr lang="en-US"/>
           </a:p>
@@ -2048,7 +2055,7 @@
           <a:p>
             <a:fld id="{5DCE9035-4A16-5448-9596-651BFBF89D25}" type="datetimeFigureOut">
               <a:rPr lang="en-US" smtClean="0"/>
-              <a:t>11/2/2022</a:t>
+              <a:t>11/3/2022</a:t>
             </a:fld>
             <a:endParaRPr lang="en-US"/>
           </a:p>
@@ -2166,7 +2173,7 @@
           <a:p>
             <a:fld id="{5DCE9035-4A16-5448-9596-651BFBF89D25}" type="datetimeFigureOut">
               <a:rPr lang="en-US" smtClean="0"/>
-              <a:t>11/2/2022</a:t>
+              <a:t>11/3/2022</a:t>
             </a:fld>
             <a:endParaRPr lang="en-US"/>
           </a:p>
@@ -2261,7 +2268,7 @@
           <a:p>
             <a:fld id="{5DCE9035-4A16-5448-9596-651BFBF89D25}" type="datetimeFigureOut">
               <a:rPr lang="en-US" smtClean="0"/>
-              <a:t>11/2/2022</a:t>
+              <a:t>11/3/2022</a:t>
             </a:fld>
             <a:endParaRPr lang="en-US"/>
           </a:p>
@@ -2538,7 +2545,7 @@
           <a:p>
             <a:fld id="{5DCE9035-4A16-5448-9596-651BFBF89D25}" type="datetimeFigureOut">
               <a:rPr lang="en-US" smtClean="0"/>
-              <a:t>11/2/2022</a:t>
+              <a:t>11/3/2022</a:t>
             </a:fld>
             <a:endParaRPr lang="en-US"/>
           </a:p>
@@ -2795,7 +2802,7 @@
           <a:p>
             <a:fld id="{5DCE9035-4A16-5448-9596-651BFBF89D25}" type="datetimeFigureOut">
               <a:rPr lang="en-US" smtClean="0"/>
-              <a:t>11/2/2022</a:t>
+              <a:t>11/3/2022</a:t>
             </a:fld>
             <a:endParaRPr lang="en-US"/>
           </a:p>
@@ -3008,7 +3015,7 @@
           <a:p>
             <a:fld id="{5DCE9035-4A16-5448-9596-651BFBF89D25}" type="datetimeFigureOut">
               <a:rPr lang="en-US" smtClean="0"/>
-              <a:t>11/2/2022</a:t>
+              <a:t>11/3/2022</a:t>
             </a:fld>
             <a:endParaRPr lang="en-US"/>
           </a:p>
@@ -3553,6 +3560,767 @@
 </p:sld>
 </file>
 
+<file path=ppt/slides/slide10.xml><?xml version="1.0" encoding="utf-8"?>
+<p:sld xmlns:a="http://schemas.openxmlformats.org/drawingml/2006/main" xmlns:r="http://schemas.openxmlformats.org/officeDocument/2006/relationships" xmlns:p="http://schemas.openxmlformats.org/presentationml/2006/main">
+  <p:cSld>
+    <p:bg>
+      <p:bgPr>
+        <a:solidFill>
+          <a:srgbClr val="1F4E79"/>
+        </a:solidFill>
+        <a:effectLst/>
+      </p:bgPr>
+    </p:bg>
+    <p:spTree>
+      <p:nvGrpSpPr>
+        <p:cNvPr id="1" name=""/>
+        <p:cNvGrpSpPr/>
+        <p:nvPr/>
+      </p:nvGrpSpPr>
+      <p:grpSpPr>
+        <a:xfrm>
+          <a:off x="0" y="0"/>
+          <a:ext cx="0" cy="0"/>
+          <a:chOff x="0" y="0"/>
+          <a:chExt cx="0" cy="0"/>
+        </a:xfrm>
+      </p:grpSpPr>
+      <p:sp>
+        <p:nvSpPr>
+          <p:cNvPr id="4" name="Title 3">
+            <a:extLst>
+              <a:ext uri="{FF2B5EF4-FFF2-40B4-BE49-F238E27FC236}">
+                <a16:creationId xmlns:a16="http://schemas.microsoft.com/office/drawing/2014/main" id="{34BB7737-EC04-5F55-11BD-E78EE10FC2A4}"/>
+              </a:ext>
+            </a:extLst>
+          </p:cNvPr>
+          <p:cNvSpPr>
+            <a:spLocks noGrp="1"/>
+          </p:cNvSpPr>
+          <p:nvPr>
+            <p:ph type="title"/>
+          </p:nvPr>
+        </p:nvSpPr>
+        <p:spPr>
+          <a:xfrm>
+            <a:off x="685800" y="23020"/>
+            <a:ext cx="10515600" cy="1325563"/>
+          </a:xfrm>
+        </p:spPr>
+        <p:txBody>
+          <a:bodyPr>
+            <a:normAutofit/>
+          </a:bodyPr>
+          <a:lstStyle/>
+          <a:p>
+            <a:pPr algn="ctr"/>
+            <a:r>
+              <a:rPr lang="en-US" sz="4000" dirty="0">
+                <a:solidFill>
+                  <a:schemeClr val="bg1"/>
+                </a:solidFill>
+              </a:rPr>
+              <a:t>Conditions for using a Chi-Sq Test 2</a:t>
+            </a:r>
+          </a:p>
+        </p:txBody>
+      </p:sp>
+      <p:sp>
+        <p:nvSpPr>
+          <p:cNvPr id="2" name="TextBox 1">
+            <a:extLst>
+              <a:ext uri="{FF2B5EF4-FFF2-40B4-BE49-F238E27FC236}">
+                <a16:creationId xmlns:a16="http://schemas.microsoft.com/office/drawing/2014/main" id="{095DAB90-15F7-E7C6-E152-A77F3559C681}"/>
+              </a:ext>
+            </a:extLst>
+          </p:cNvPr>
+          <p:cNvSpPr txBox="1"/>
+          <p:nvPr/>
+        </p:nvSpPr>
+        <p:spPr>
+          <a:xfrm>
+            <a:off x="2303583" y="931664"/>
+            <a:ext cx="6529754" cy="2308324"/>
+          </a:xfrm>
+          <a:prstGeom prst="rect">
+            <a:avLst/>
+          </a:prstGeom>
+          <a:solidFill>
+            <a:srgbClr val="C00000"/>
+          </a:solidFill>
+          <a:ln>
+            <a:solidFill>
+              <a:schemeClr val="bg1"/>
+            </a:solidFill>
+          </a:ln>
+        </p:spPr>
+        <p:txBody>
+          <a:bodyPr wrap="square" rtlCol="0">
+            <a:spAutoFit/>
+          </a:bodyPr>
+          <a:lstStyle/>
+          <a:p>
+            <a:pPr algn="ctr"/>
+            <a:r>
+              <a:rPr lang="en-US" sz="2400" b="1" dirty="0">
+                <a:solidFill>
+                  <a:srgbClr val="000000"/>
+                </a:solidFill>
+                <a:latin typeface="Helvetica" panose="020B0604020202020204" pitchFamily="34" charset="0"/>
+              </a:rPr>
+              <a:t>	</a:t>
+            </a:r>
+            <a:r>
+              <a:rPr lang="en-US" sz="2000" b="1" dirty="0">
+                <a:solidFill>
+                  <a:schemeClr val="bg1"/>
+                </a:solidFill>
+              </a:rPr>
+              <a:t>We can see in our previous graphs that all our states have at least n=33 observations and the mean of stbcp is 0.144. So for the smallest number of state observations (AK) </a:t>
+            </a:r>
+          </a:p>
+          <a:p>
+            <a:pPr algn="ctr"/>
+            <a:r>
+              <a:rPr lang="en-US" sz="2000" b="1" dirty="0">
+                <a:solidFill>
+                  <a:schemeClr val="bg1"/>
+                </a:solidFill>
+              </a:rPr>
+              <a:t>0.144*33= 4.752</a:t>
+            </a:r>
+          </a:p>
+          <a:p>
+            <a:pPr algn="ctr"/>
+            <a:r>
+              <a:rPr lang="en-US" sz="2000" b="1" dirty="0">
+                <a:solidFill>
+                  <a:schemeClr val="bg1"/>
+                </a:solidFill>
+              </a:rPr>
+              <a:t>The rest of the states all have larger observation numbers (next smallest is 39), so we can say that 80%  of our data easily passes this threshold of 5</a:t>
+            </a:r>
+          </a:p>
+        </p:txBody>
+      </p:sp>
+      <p:sp>
+        <p:nvSpPr>
+          <p:cNvPr id="3" name="TextBox 2">
+            <a:extLst>
+              <a:ext uri="{FF2B5EF4-FFF2-40B4-BE49-F238E27FC236}">
+                <a16:creationId xmlns:a16="http://schemas.microsoft.com/office/drawing/2014/main" id="{FD0AFBD4-F079-FCCA-4F36-14BE980953A6}"/>
+              </a:ext>
+            </a:extLst>
+          </p:cNvPr>
+          <p:cNvSpPr txBox="1"/>
+          <p:nvPr/>
+        </p:nvSpPr>
+        <p:spPr>
+          <a:xfrm>
+            <a:off x="7288414" y="6550223"/>
+            <a:ext cx="4903586" cy="307777"/>
+          </a:xfrm>
+          <a:prstGeom prst="rect">
+            <a:avLst/>
+          </a:prstGeom>
+          <a:noFill/>
+        </p:spPr>
+        <p:txBody>
+          <a:bodyPr wrap="none" rtlCol="0">
+            <a:spAutoFit/>
+          </a:bodyPr>
+          <a:lstStyle/>
+          <a:p>
+            <a:r>
+              <a:rPr lang="en-US" sz="1400" dirty="0"/>
+              <a:t>Source: https://www.statology.org/chi-square-test-assumptions/</a:t>
+            </a:r>
+          </a:p>
+        </p:txBody>
+      </p:sp>
+      <p:sp>
+        <p:nvSpPr>
+          <p:cNvPr id="5" name="AutoShape 2">
+            <a:extLst>
+              <a:ext uri="{FF2B5EF4-FFF2-40B4-BE49-F238E27FC236}">
+                <a16:creationId xmlns:a16="http://schemas.microsoft.com/office/drawing/2014/main" id="{033924C3-2224-27A7-E3B7-AC6898F74CEB}"/>
+              </a:ext>
+            </a:extLst>
+          </p:cNvPr>
+          <p:cNvSpPr>
+            <a:spLocks noChangeAspect="1" noChangeArrowheads="1"/>
+          </p:cNvSpPr>
+          <p:nvPr/>
+        </p:nvSpPr>
+        <p:spPr bwMode="auto">
+          <a:xfrm>
+            <a:off x="5943600" y="3276600"/>
+            <a:ext cx="304800" cy="304800"/>
+          </a:xfrm>
+          <a:prstGeom prst="rect">
+            <a:avLst/>
+          </a:prstGeom>
+          <a:noFill/>
+          <a:extLst>
+            <a:ext uri="{909E8E84-426E-40DD-AFC4-6F175D3DCCD1}">
+              <a14:hiddenFill xmlns:a14="http://schemas.microsoft.com/office/drawing/2010/main">
+                <a:solidFill>
+                  <a:srgbClr val="FFFFFF"/>
+                </a:solidFill>
+              </a14:hiddenFill>
+            </a:ext>
+          </a:extLst>
+        </p:spPr>
+        <p:txBody>
+          <a:bodyPr vert="horz" wrap="square" lIns="91440" tIns="45720" rIns="91440" bIns="45720" numCol="1" anchor="t" anchorCtr="0" compatLnSpc="1">
+            <a:prstTxWarp prst="textNoShape">
+              <a:avLst/>
+            </a:prstTxWarp>
+          </a:bodyPr>
+          <a:lstStyle/>
+          <a:p>
+            <a:endParaRPr lang="en-US"/>
+          </a:p>
+        </p:txBody>
+      </p:sp>
+      <p:sp>
+        <p:nvSpPr>
+          <p:cNvPr id="6" name="AutoShape 4">
+            <a:extLst>
+              <a:ext uri="{FF2B5EF4-FFF2-40B4-BE49-F238E27FC236}">
+                <a16:creationId xmlns:a16="http://schemas.microsoft.com/office/drawing/2014/main" id="{27BE0490-7CEB-9929-A376-AF78AA7A7907}"/>
+              </a:ext>
+            </a:extLst>
+          </p:cNvPr>
+          <p:cNvSpPr>
+            <a:spLocks noChangeAspect="1" noChangeArrowheads="1"/>
+          </p:cNvSpPr>
+          <p:nvPr/>
+        </p:nvSpPr>
+        <p:spPr bwMode="auto">
+          <a:xfrm>
+            <a:off x="6096000" y="3429000"/>
+            <a:ext cx="304800" cy="304800"/>
+          </a:xfrm>
+          <a:prstGeom prst="rect">
+            <a:avLst/>
+          </a:prstGeom>
+          <a:noFill/>
+          <a:extLst>
+            <a:ext uri="{909E8E84-426E-40DD-AFC4-6F175D3DCCD1}">
+              <a14:hiddenFill xmlns:a14="http://schemas.microsoft.com/office/drawing/2010/main">
+                <a:solidFill>
+                  <a:srgbClr val="FFFFFF"/>
+                </a:solidFill>
+              </a14:hiddenFill>
+            </a:ext>
+          </a:extLst>
+        </p:spPr>
+        <p:txBody>
+          <a:bodyPr vert="horz" wrap="square" lIns="91440" tIns="45720" rIns="91440" bIns="45720" numCol="1" anchor="t" anchorCtr="0" compatLnSpc="1">
+            <a:prstTxWarp prst="textNoShape">
+              <a:avLst/>
+            </a:prstTxWarp>
+          </a:bodyPr>
+          <a:lstStyle/>
+          <a:p>
+            <a:endParaRPr lang="en-US"/>
+          </a:p>
+        </p:txBody>
+      </p:sp>
+      <p:sp>
+        <p:nvSpPr>
+          <p:cNvPr id="7" name="AutoShape 6">
+            <a:extLst>
+              <a:ext uri="{FF2B5EF4-FFF2-40B4-BE49-F238E27FC236}">
+                <a16:creationId xmlns:a16="http://schemas.microsoft.com/office/drawing/2014/main" id="{1E2B74BC-376D-90FF-747E-7B976D2F316E}"/>
+              </a:ext>
+            </a:extLst>
+          </p:cNvPr>
+          <p:cNvSpPr>
+            <a:spLocks noChangeAspect="1" noChangeArrowheads="1"/>
+          </p:cNvSpPr>
+          <p:nvPr/>
+        </p:nvSpPr>
+        <p:spPr bwMode="auto">
+          <a:xfrm>
+            <a:off x="7737231" y="3276599"/>
+            <a:ext cx="2895599" cy="2895599"/>
+          </a:xfrm>
+          <a:prstGeom prst="rect">
+            <a:avLst/>
+          </a:prstGeom>
+          <a:noFill/>
+          <a:extLst>
+            <a:ext uri="{909E8E84-426E-40DD-AFC4-6F175D3DCCD1}">
+              <a14:hiddenFill xmlns:a14="http://schemas.microsoft.com/office/drawing/2010/main">
+                <a:solidFill>
+                  <a:srgbClr val="FFFFFF"/>
+                </a:solidFill>
+              </a14:hiddenFill>
+            </a:ext>
+          </a:extLst>
+        </p:spPr>
+        <p:txBody>
+          <a:bodyPr vert="horz" wrap="square" lIns="91440" tIns="45720" rIns="91440" bIns="45720" numCol="1" anchor="t" anchorCtr="0" compatLnSpc="1">
+            <a:prstTxWarp prst="textNoShape">
+              <a:avLst/>
+            </a:prstTxWarp>
+          </a:bodyPr>
+          <a:lstStyle/>
+          <a:p>
+            <a:endParaRPr lang="en-US"/>
+          </a:p>
+        </p:txBody>
+      </p:sp>
+      <p:pic>
+        <p:nvPicPr>
+          <p:cNvPr id="9" name="Picture 8">
+            <a:extLst>
+              <a:ext uri="{FF2B5EF4-FFF2-40B4-BE49-F238E27FC236}">
+                <a16:creationId xmlns:a16="http://schemas.microsoft.com/office/drawing/2014/main" id="{052B3635-917D-9CD4-414D-0E1743C64AD6}"/>
+              </a:ext>
+            </a:extLst>
+          </p:cNvPr>
+          <p:cNvPicPr>
+            <a:picLocks noChangeAspect="1"/>
+          </p:cNvPicPr>
+          <p:nvPr/>
+        </p:nvPicPr>
+        <p:blipFill rotWithShape="1">
+          <a:blip r:embed="rId2"/>
+          <a:srcRect t="6587" r="2080" b="10804"/>
+          <a:stretch/>
+        </p:blipFill>
+        <p:spPr>
+          <a:xfrm>
+            <a:off x="2303583" y="3266275"/>
+            <a:ext cx="6529755" cy="3399692"/>
+          </a:xfrm>
+          <a:prstGeom prst="rect">
+            <a:avLst/>
+          </a:prstGeom>
+        </p:spPr>
+      </p:pic>
+    </p:spTree>
+    <p:extLst>
+      <p:ext uri="{BB962C8B-B14F-4D97-AF65-F5344CB8AC3E}">
+        <p14:creationId xmlns:p14="http://schemas.microsoft.com/office/powerpoint/2010/main" val="4183306932"/>
+      </p:ext>
+    </p:extLst>
+  </p:cSld>
+  <p:clrMapOvr>
+    <a:masterClrMapping/>
+  </p:clrMapOvr>
+</p:sld>
+</file>
+
+<file path=ppt/slides/slide11.xml><?xml version="1.0" encoding="utf-8"?>
+<p:sld xmlns:a="http://schemas.openxmlformats.org/drawingml/2006/main" xmlns:r="http://schemas.openxmlformats.org/officeDocument/2006/relationships" xmlns:p="http://schemas.openxmlformats.org/presentationml/2006/main">
+  <p:cSld>
+    <p:bg>
+      <p:bgPr>
+        <a:solidFill>
+          <a:srgbClr val="1F4E79"/>
+        </a:solidFill>
+        <a:effectLst/>
+      </p:bgPr>
+    </p:bg>
+    <p:spTree>
+      <p:nvGrpSpPr>
+        <p:cNvPr id="1" name=""/>
+        <p:cNvGrpSpPr/>
+        <p:nvPr/>
+      </p:nvGrpSpPr>
+      <p:grpSpPr>
+        <a:xfrm>
+          <a:off x="0" y="0"/>
+          <a:ext cx="0" cy="0"/>
+          <a:chOff x="0" y="0"/>
+          <a:chExt cx="0" cy="0"/>
+        </a:xfrm>
+      </p:grpSpPr>
+      <p:sp>
+        <p:nvSpPr>
+          <p:cNvPr id="4" name="Title 3">
+            <a:extLst>
+              <a:ext uri="{FF2B5EF4-FFF2-40B4-BE49-F238E27FC236}">
+                <a16:creationId xmlns:a16="http://schemas.microsoft.com/office/drawing/2014/main" id="{34BB7737-EC04-5F55-11BD-E78EE10FC2A4}"/>
+              </a:ext>
+            </a:extLst>
+          </p:cNvPr>
+          <p:cNvSpPr>
+            <a:spLocks noGrp="1"/>
+          </p:cNvSpPr>
+          <p:nvPr>
+            <p:ph type="title"/>
+          </p:nvPr>
+        </p:nvSpPr>
+        <p:spPr>
+          <a:xfrm>
+            <a:off x="685800" y="23020"/>
+            <a:ext cx="10515600" cy="1325563"/>
+          </a:xfrm>
+        </p:spPr>
+        <p:txBody>
+          <a:bodyPr>
+            <a:normAutofit/>
+          </a:bodyPr>
+          <a:lstStyle/>
+          <a:p>
+            <a:pPr algn="ctr"/>
+            <a:r>
+              <a:rPr lang="en-US" sz="4000" dirty="0">
+                <a:solidFill>
+                  <a:schemeClr val="bg1"/>
+                </a:solidFill>
+              </a:rPr>
+              <a:t>The Results</a:t>
+            </a:r>
+          </a:p>
+        </p:txBody>
+      </p:sp>
+      <p:sp>
+        <p:nvSpPr>
+          <p:cNvPr id="3" name="TextBox 2">
+            <a:extLst>
+              <a:ext uri="{FF2B5EF4-FFF2-40B4-BE49-F238E27FC236}">
+                <a16:creationId xmlns:a16="http://schemas.microsoft.com/office/drawing/2014/main" id="{FD0AFBD4-F079-FCCA-4F36-14BE980953A6}"/>
+              </a:ext>
+            </a:extLst>
+          </p:cNvPr>
+          <p:cNvSpPr txBox="1"/>
+          <p:nvPr/>
+        </p:nvSpPr>
+        <p:spPr>
+          <a:xfrm>
+            <a:off x="7288414" y="6550223"/>
+            <a:ext cx="4903586" cy="307777"/>
+          </a:xfrm>
+          <a:prstGeom prst="rect">
+            <a:avLst/>
+          </a:prstGeom>
+          <a:noFill/>
+        </p:spPr>
+        <p:txBody>
+          <a:bodyPr wrap="none" rtlCol="0">
+            <a:spAutoFit/>
+          </a:bodyPr>
+          <a:lstStyle/>
+          <a:p>
+            <a:r>
+              <a:rPr lang="en-US" sz="1400" dirty="0"/>
+              <a:t>Source: https://www.statology.org/chi-square-test-assumptions/</a:t>
+            </a:r>
+          </a:p>
+        </p:txBody>
+      </p:sp>
+      <p:sp>
+        <p:nvSpPr>
+          <p:cNvPr id="5" name="AutoShape 2">
+            <a:extLst>
+              <a:ext uri="{FF2B5EF4-FFF2-40B4-BE49-F238E27FC236}">
+                <a16:creationId xmlns:a16="http://schemas.microsoft.com/office/drawing/2014/main" id="{033924C3-2224-27A7-E3B7-AC6898F74CEB}"/>
+              </a:ext>
+            </a:extLst>
+          </p:cNvPr>
+          <p:cNvSpPr>
+            <a:spLocks noChangeAspect="1" noChangeArrowheads="1"/>
+          </p:cNvSpPr>
+          <p:nvPr/>
+        </p:nvSpPr>
+        <p:spPr bwMode="auto">
+          <a:xfrm>
+            <a:off x="5943600" y="3276600"/>
+            <a:ext cx="304800" cy="304800"/>
+          </a:xfrm>
+          <a:prstGeom prst="rect">
+            <a:avLst/>
+          </a:prstGeom>
+          <a:noFill/>
+          <a:extLst>
+            <a:ext uri="{909E8E84-426E-40DD-AFC4-6F175D3DCCD1}">
+              <a14:hiddenFill xmlns:a14="http://schemas.microsoft.com/office/drawing/2010/main">
+                <a:solidFill>
+                  <a:srgbClr val="FFFFFF"/>
+                </a:solidFill>
+              </a14:hiddenFill>
+            </a:ext>
+          </a:extLst>
+        </p:spPr>
+        <p:txBody>
+          <a:bodyPr vert="horz" wrap="square" lIns="91440" tIns="45720" rIns="91440" bIns="45720" numCol="1" anchor="t" anchorCtr="0" compatLnSpc="1">
+            <a:prstTxWarp prst="textNoShape">
+              <a:avLst/>
+            </a:prstTxWarp>
+          </a:bodyPr>
+          <a:lstStyle/>
+          <a:p>
+            <a:endParaRPr lang="en-US"/>
+          </a:p>
+        </p:txBody>
+      </p:sp>
+      <p:sp>
+        <p:nvSpPr>
+          <p:cNvPr id="6" name="AutoShape 4">
+            <a:extLst>
+              <a:ext uri="{FF2B5EF4-FFF2-40B4-BE49-F238E27FC236}">
+                <a16:creationId xmlns:a16="http://schemas.microsoft.com/office/drawing/2014/main" id="{27BE0490-7CEB-9929-A376-AF78AA7A7907}"/>
+              </a:ext>
+            </a:extLst>
+          </p:cNvPr>
+          <p:cNvSpPr>
+            <a:spLocks noChangeAspect="1" noChangeArrowheads="1"/>
+          </p:cNvSpPr>
+          <p:nvPr/>
+        </p:nvSpPr>
+        <p:spPr bwMode="auto">
+          <a:xfrm>
+            <a:off x="6096000" y="3429000"/>
+            <a:ext cx="304800" cy="304800"/>
+          </a:xfrm>
+          <a:prstGeom prst="rect">
+            <a:avLst/>
+          </a:prstGeom>
+          <a:noFill/>
+          <a:extLst>
+            <a:ext uri="{909E8E84-426E-40DD-AFC4-6F175D3DCCD1}">
+              <a14:hiddenFill xmlns:a14="http://schemas.microsoft.com/office/drawing/2010/main">
+                <a:solidFill>
+                  <a:srgbClr val="FFFFFF"/>
+                </a:solidFill>
+              </a14:hiddenFill>
+            </a:ext>
+          </a:extLst>
+        </p:spPr>
+        <p:txBody>
+          <a:bodyPr vert="horz" wrap="square" lIns="91440" tIns="45720" rIns="91440" bIns="45720" numCol="1" anchor="t" anchorCtr="0" compatLnSpc="1">
+            <a:prstTxWarp prst="textNoShape">
+              <a:avLst/>
+            </a:prstTxWarp>
+          </a:bodyPr>
+          <a:lstStyle/>
+          <a:p>
+            <a:endParaRPr lang="en-US"/>
+          </a:p>
+        </p:txBody>
+      </p:sp>
+      <p:sp>
+        <p:nvSpPr>
+          <p:cNvPr id="7" name="AutoShape 6">
+            <a:extLst>
+              <a:ext uri="{FF2B5EF4-FFF2-40B4-BE49-F238E27FC236}">
+                <a16:creationId xmlns:a16="http://schemas.microsoft.com/office/drawing/2014/main" id="{1E2B74BC-376D-90FF-747E-7B976D2F316E}"/>
+              </a:ext>
+            </a:extLst>
+          </p:cNvPr>
+          <p:cNvSpPr>
+            <a:spLocks noChangeAspect="1" noChangeArrowheads="1"/>
+          </p:cNvSpPr>
+          <p:nvPr/>
+        </p:nvSpPr>
+        <p:spPr bwMode="auto">
+          <a:xfrm>
+            <a:off x="7737231" y="3276599"/>
+            <a:ext cx="2895599" cy="2895599"/>
+          </a:xfrm>
+          <a:prstGeom prst="rect">
+            <a:avLst/>
+          </a:prstGeom>
+          <a:noFill/>
+          <a:extLst>
+            <a:ext uri="{909E8E84-426E-40DD-AFC4-6F175D3DCCD1}">
+              <a14:hiddenFill xmlns:a14="http://schemas.microsoft.com/office/drawing/2010/main">
+                <a:solidFill>
+                  <a:srgbClr val="FFFFFF"/>
+                </a:solidFill>
+              </a14:hiddenFill>
+            </a:ext>
+          </a:extLst>
+        </p:spPr>
+        <p:txBody>
+          <a:bodyPr vert="horz" wrap="square" lIns="91440" tIns="45720" rIns="91440" bIns="45720" numCol="1" anchor="t" anchorCtr="0" compatLnSpc="1">
+            <a:prstTxWarp prst="textNoShape">
+              <a:avLst/>
+            </a:prstTxWarp>
+          </a:bodyPr>
+          <a:lstStyle/>
+          <a:p>
+            <a:endParaRPr lang="en-US"/>
+          </a:p>
+        </p:txBody>
+      </p:sp>
+      <p:pic>
+        <p:nvPicPr>
+          <p:cNvPr id="10" name="Picture 9">
+            <a:extLst>
+              <a:ext uri="{FF2B5EF4-FFF2-40B4-BE49-F238E27FC236}">
+                <a16:creationId xmlns:a16="http://schemas.microsoft.com/office/drawing/2014/main" id="{689B6640-EE4C-286B-072C-C12D3C245FAB}"/>
+              </a:ext>
+            </a:extLst>
+          </p:cNvPr>
+          <p:cNvPicPr>
+            <a:picLocks noChangeAspect="1"/>
+          </p:cNvPicPr>
+          <p:nvPr/>
+        </p:nvPicPr>
+        <p:blipFill>
+          <a:blip r:embed="rId2"/>
+          <a:stretch>
+            <a:fillRect/>
+          </a:stretch>
+        </p:blipFill>
+        <p:spPr>
+          <a:xfrm>
+            <a:off x="1666701" y="1427510"/>
+            <a:ext cx="8858598" cy="4612579"/>
+          </a:xfrm>
+          <a:prstGeom prst="rect">
+            <a:avLst/>
+          </a:prstGeom>
+          <a:ln w="31750">
+            <a:solidFill>
+              <a:srgbClr val="C00000"/>
+            </a:solidFill>
+          </a:ln>
+        </p:spPr>
+      </p:pic>
+    </p:spTree>
+    <p:extLst>
+      <p:ext uri="{BB962C8B-B14F-4D97-AF65-F5344CB8AC3E}">
+        <p14:creationId xmlns:p14="http://schemas.microsoft.com/office/powerpoint/2010/main" val="2094093929"/>
+      </p:ext>
+    </p:extLst>
+  </p:cSld>
+  <p:clrMapOvr>
+    <a:masterClrMapping/>
+  </p:clrMapOvr>
+</p:sld>
+</file>
+
+<file path=ppt/slides/slide12.xml><?xml version="1.0" encoding="utf-8"?>
+<p:sld xmlns:a="http://schemas.openxmlformats.org/drawingml/2006/main" xmlns:r="http://schemas.openxmlformats.org/officeDocument/2006/relationships" xmlns:p="http://schemas.openxmlformats.org/presentationml/2006/main">
+  <p:cSld>
+    <p:bg>
+      <p:bgPr>
+        <a:solidFill>
+          <a:srgbClr val="C00000"/>
+        </a:solidFill>
+        <a:effectLst/>
+      </p:bgPr>
+    </p:bg>
+    <p:spTree>
+      <p:nvGrpSpPr>
+        <p:cNvPr id="1" name=""/>
+        <p:cNvGrpSpPr/>
+        <p:nvPr/>
+      </p:nvGrpSpPr>
+      <p:grpSpPr>
+        <a:xfrm>
+          <a:off x="0" y="0"/>
+          <a:ext cx="0" cy="0"/>
+          <a:chOff x="0" y="0"/>
+          <a:chExt cx="0" cy="0"/>
+        </a:xfrm>
+      </p:grpSpPr>
+      <p:sp>
+        <p:nvSpPr>
+          <p:cNvPr id="2" name="Title 1">
+            <a:extLst>
+              <a:ext uri="{FF2B5EF4-FFF2-40B4-BE49-F238E27FC236}">
+                <a16:creationId xmlns:a16="http://schemas.microsoft.com/office/drawing/2014/main" id="{E330BA9D-0DFB-EE75-8F05-265529606CEC}"/>
+              </a:ext>
+            </a:extLst>
+          </p:cNvPr>
+          <p:cNvSpPr>
+            <a:spLocks noGrp="1"/>
+          </p:cNvSpPr>
+          <p:nvPr>
+            <p:ph type="title"/>
+          </p:nvPr>
+        </p:nvSpPr>
+        <p:spPr>
+          <a:xfrm>
+            <a:off x="838200" y="423740"/>
+            <a:ext cx="10515600" cy="1325563"/>
+          </a:xfrm>
+        </p:spPr>
+        <p:txBody>
+          <a:bodyPr>
+            <a:normAutofit fontScale="90000"/>
+          </a:bodyPr>
+          <a:lstStyle/>
+          <a:p>
+            <a:r>
+              <a:rPr lang="en-US" dirty="0"/>
+              <a:t>Thank You For Listening</a:t>
+            </a:r>
+            <a:br>
+              <a:rPr lang="en-US" dirty="0"/>
+            </a:br>
+            <a:br>
+              <a:rPr lang="en-US" dirty="0"/>
+            </a:br>
+            <a:endParaRPr lang="en-US" dirty="0"/>
+          </a:p>
+        </p:txBody>
+      </p:sp>
+      <p:sp>
+        <p:nvSpPr>
+          <p:cNvPr id="3" name="TextBox 2">
+            <a:extLst>
+              <a:ext uri="{FF2B5EF4-FFF2-40B4-BE49-F238E27FC236}">
+                <a16:creationId xmlns:a16="http://schemas.microsoft.com/office/drawing/2014/main" id="{AFCEAE1F-1348-4A21-77BC-13A36AA297D3}"/>
+              </a:ext>
+            </a:extLst>
+          </p:cNvPr>
+          <p:cNvSpPr txBox="1"/>
+          <p:nvPr/>
+        </p:nvSpPr>
+        <p:spPr>
+          <a:xfrm>
+            <a:off x="3856892" y="2864042"/>
+            <a:ext cx="4009293" cy="707886"/>
+          </a:xfrm>
+          <a:prstGeom prst="rect">
+            <a:avLst/>
+          </a:prstGeom>
+          <a:solidFill>
+            <a:srgbClr val="5A67CA"/>
+          </a:solidFill>
+          <a:ln>
+            <a:solidFill>
+              <a:schemeClr val="bg1"/>
+            </a:solidFill>
+          </a:ln>
+        </p:spPr>
+        <p:txBody>
+          <a:bodyPr wrap="square" rtlCol="0">
+            <a:spAutoFit/>
+          </a:bodyPr>
+          <a:lstStyle/>
+          <a:p>
+            <a:pPr algn="ctr"/>
+            <a:r>
+              <a:rPr lang="en-US" sz="4000" dirty="0"/>
+              <a:t>Questions ?</a:t>
+            </a:r>
+          </a:p>
+        </p:txBody>
+      </p:sp>
+    </p:spTree>
+    <p:extLst>
+      <p:ext uri="{BB962C8B-B14F-4D97-AF65-F5344CB8AC3E}">
+        <p14:creationId xmlns:p14="http://schemas.microsoft.com/office/powerpoint/2010/main" val="1301365000"/>
+      </p:ext>
+    </p:extLst>
+  </p:cSld>
+  <p:clrMapOvr>
+    <a:masterClrMapping/>
+  </p:clrMapOvr>
+</p:sld>
+</file>
+
 <file path=ppt/slides/slide2.xml><?xml version="1.0" encoding="utf-8"?>
 <p:sld xmlns:a="http://schemas.openxmlformats.org/drawingml/2006/main" xmlns:r="http://schemas.openxmlformats.org/officeDocument/2006/relationships" xmlns:p="http://schemas.openxmlformats.org/presentationml/2006/main">
   <p:cSld>
@@ -4563,6 +5331,89 @@
 <file path=ppt/slides/slide3.xml><?xml version="1.0" encoding="utf-8"?>
 <p:sld xmlns:a="http://schemas.openxmlformats.org/drawingml/2006/main" xmlns:r="http://schemas.openxmlformats.org/officeDocument/2006/relationships" xmlns:p="http://schemas.openxmlformats.org/presentationml/2006/main">
   <p:cSld>
+    <p:spTree>
+      <p:nvGrpSpPr>
+        <p:cNvPr id="1" name=""/>
+        <p:cNvGrpSpPr/>
+        <p:nvPr/>
+      </p:nvGrpSpPr>
+      <p:grpSpPr>
+        <a:xfrm>
+          <a:off x="0" y="0"/>
+          <a:ext cx="0" cy="0"/>
+          <a:chOff x="0" y="0"/>
+          <a:chExt cx="0" cy="0"/>
+        </a:xfrm>
+      </p:grpSpPr>
+      <p:sp>
+        <p:nvSpPr>
+          <p:cNvPr id="2" name="Title 1">
+            <a:extLst>
+              <a:ext uri="{FF2B5EF4-FFF2-40B4-BE49-F238E27FC236}">
+                <a16:creationId xmlns:a16="http://schemas.microsoft.com/office/drawing/2014/main" id="{245F18AF-B54D-FF57-1C49-84B9320DF682}"/>
+              </a:ext>
+            </a:extLst>
+          </p:cNvPr>
+          <p:cNvSpPr>
+            <a:spLocks noGrp="1"/>
+          </p:cNvSpPr>
+          <p:nvPr>
+            <p:ph type="title"/>
+          </p:nvPr>
+        </p:nvSpPr>
+        <p:spPr/>
+        <p:txBody>
+          <a:bodyPr/>
+          <a:lstStyle/>
+          <a:p>
+            <a:r>
+              <a:rPr lang="en-US" dirty="0"/>
+              <a:t>RAJEEV START HERE</a:t>
+            </a:r>
+          </a:p>
+        </p:txBody>
+      </p:sp>
+      <p:sp>
+        <p:nvSpPr>
+          <p:cNvPr id="3" name="Content Placeholder 2">
+            <a:extLst>
+              <a:ext uri="{FF2B5EF4-FFF2-40B4-BE49-F238E27FC236}">
+                <a16:creationId xmlns:a16="http://schemas.microsoft.com/office/drawing/2014/main" id="{C2CE18FB-6367-DF80-602C-1DE2EFD2EAF4}"/>
+              </a:ext>
+            </a:extLst>
+          </p:cNvPr>
+          <p:cNvSpPr>
+            <a:spLocks noGrp="1"/>
+          </p:cNvSpPr>
+          <p:nvPr>
+            <p:ph idx="1"/>
+          </p:nvPr>
+        </p:nvSpPr>
+        <p:spPr/>
+        <p:txBody>
+          <a:bodyPr/>
+          <a:lstStyle/>
+          <a:p>
+            <a:endParaRPr lang="en-US"/>
+          </a:p>
+        </p:txBody>
+      </p:sp>
+    </p:spTree>
+    <p:extLst>
+      <p:ext uri="{BB962C8B-B14F-4D97-AF65-F5344CB8AC3E}">
+        <p14:creationId xmlns:p14="http://schemas.microsoft.com/office/powerpoint/2010/main" val="129348094"/>
+      </p:ext>
+    </p:extLst>
+  </p:cSld>
+  <p:clrMapOvr>
+    <a:masterClrMapping/>
+  </p:clrMapOvr>
+</p:sld>
+</file>
+
+<file path=ppt/slides/slide4.xml><?xml version="1.0" encoding="utf-8"?>
+<p:sld xmlns:a="http://schemas.openxmlformats.org/drawingml/2006/main" xmlns:r="http://schemas.openxmlformats.org/officeDocument/2006/relationships" xmlns:p="http://schemas.openxmlformats.org/presentationml/2006/main">
+  <p:cSld>
     <p:bg>
       <p:bgPr>
         <a:solidFill>
@@ -4709,7 +5560,55 @@
                 <a:effectLst/>
                 <a:latin typeface="Helvetica" pitchFamily="2" charset="0"/>
               </a:rPr>
-              <a:t>Within our data set of 6,574 observations of police shootings from 2015 to 2022 in the United States, is there a correlation between the U.S. state of observation and whether a body camera was turned on during the shooting?</a:t>
+              <a:t>Within our data set of 6,574 observations of police shootings from 2015 to 2022 in the United States, is there a </a:t>
+            </a:r>
+            <a:r>
+              <a:rPr lang="en-US" sz="1800" b="0" i="0" u="sng" strike="noStrike" dirty="0">
+                <a:solidFill>
+                  <a:schemeClr val="bg1"/>
+                </a:solidFill>
+                <a:effectLst/>
+                <a:latin typeface="Helvetica" pitchFamily="2" charset="0"/>
+              </a:rPr>
+              <a:t>significant </a:t>
+            </a:r>
+            <a:r>
+              <a:rPr lang="en-US" dirty="0">
+                <a:solidFill>
+                  <a:schemeClr val="bg1"/>
+                </a:solidFill>
+                <a:latin typeface="Helvetica" pitchFamily="2" charset="0"/>
+              </a:rPr>
+              <a:t>difference </a:t>
+            </a:r>
+            <a:r>
+              <a:rPr lang="en-US" sz="1800" b="0" i="0" u="none" strike="noStrike" dirty="0">
+                <a:solidFill>
+                  <a:schemeClr val="bg1"/>
+                </a:solidFill>
+                <a:effectLst/>
+                <a:latin typeface="Helvetica" pitchFamily="2" charset="0"/>
+              </a:rPr>
+              <a:t>between the U.S. </a:t>
+            </a:r>
+            <a:r>
+              <a:rPr lang="en-US" dirty="0">
+                <a:solidFill>
+                  <a:schemeClr val="bg1"/>
+                </a:solidFill>
+                <a:latin typeface="Helvetica" pitchFamily="2" charset="0"/>
+              </a:rPr>
+              <a:t>States’ proportions of fatal police shootin</a:t>
+            </a:r>
+            <a:r>
+              <a:rPr lang="en-US" sz="1800" b="0" i="0" u="none" strike="noStrike" dirty="0">
+                <a:solidFill>
+                  <a:schemeClr val="bg1"/>
+                </a:solidFill>
+                <a:effectLst/>
+                <a:latin typeface="Helvetica" pitchFamily="2" charset="0"/>
+              </a:rPr>
+              <a:t>gs that are captured by body cameras?</a:t>
             </a:r>
           </a:p>
         </p:txBody>
@@ -4861,7 +5760,45 @@
                 <a:effectLst/>
                 <a:latin typeface="Helvetica" pitchFamily="2" charset="0"/>
               </a:rPr>
-              <a:t> Statistical analysis used to identify a correlation between the two variables (correlation is easily measurable with data reshaping)</a:t>
+              <a:t> Statistical analysis used to measure </a:t>
+            </a:r>
+            <a:r>
+              <a:rPr lang="en-US" sz="1400" dirty="0">
+                <a:solidFill>
+                  <a:schemeClr val="bg1"/>
+                </a:solidFill>
+                <a:latin typeface="Helvetica" pitchFamily="2" charset="0"/>
+              </a:rPr>
+              <a:t>differences</a:t>
+            </a:r>
+            <a:r>
+              <a:rPr lang="en-US" sz="1400" b="0" i="0" u="none" strike="noStrike" dirty="0">
+                <a:solidFill>
+                  <a:schemeClr val="bg1"/>
+                </a:solidFill>
+                <a:effectLst/>
+                <a:latin typeface="Helvetica" pitchFamily="2" charset="0"/>
+              </a:rPr>
+              <a:t> between </a:t>
+            </a:r>
+            <a:r>
+              <a:rPr lang="en-US" sz="1400" dirty="0">
+                <a:solidFill>
+                  <a:schemeClr val="bg1"/>
+                </a:solidFill>
+                <a:latin typeface="Helvetica" pitchFamily="2" charset="0"/>
+              </a:rPr>
+              <a:t>many </a:t>
+            </a:r>
+            <a:r>
+              <a:rPr lang="en-US" sz="1400" b="0" i="0" u="none" strike="noStrike" dirty="0">
+                <a:solidFill>
+                  <a:schemeClr val="bg1"/>
+                </a:solidFill>
+                <a:effectLst/>
+                <a:latin typeface="Helvetica" pitchFamily="2" charset="0"/>
+              </a:rPr>
+              <a:t>proportions (this  will require data reshaping)</a:t>
             </a:r>
             <a:endParaRPr lang="en-US" sz="1400" dirty="0">
               <a:solidFill>
@@ -5131,7 +6068,7 @@
                 <a:effectLst/>
                 <a:latin typeface="Helvetica" pitchFamily="2" charset="0"/>
               </a:rPr>
-              <a:t>three people working on this research, a couple of weeks are required to perform the data analysis.</a:t>
+              <a:t>three people working on this research, a couple of weeks are required to perform the data analysis. </a:t>
             </a:r>
           </a:p>
           <a:p>
@@ -5149,89 +6086,6 @@
     <p:extLst>
       <p:ext uri="{BB962C8B-B14F-4D97-AF65-F5344CB8AC3E}">
         <p14:creationId xmlns:p14="http://schemas.microsoft.com/office/powerpoint/2010/main" val="1411176916"/>
-      </p:ext>
-    </p:extLst>
-  </p:cSld>
-  <p:clrMapOvr>
-    <a:masterClrMapping/>
-  </p:clrMapOvr>
-</p:sld>
-</file>
-
-<file path=ppt/slides/slide4.xml><?xml version="1.0" encoding="utf-8"?>
-<p:sld xmlns:a="http://schemas.openxmlformats.org/drawingml/2006/main" xmlns:r="http://schemas.openxmlformats.org/officeDocument/2006/relationships" xmlns:p="http://schemas.openxmlformats.org/presentationml/2006/main">
-  <p:cSld>
-    <p:spTree>
-      <p:nvGrpSpPr>
-        <p:cNvPr id="1" name=""/>
-        <p:cNvGrpSpPr/>
-        <p:nvPr/>
-      </p:nvGrpSpPr>
-      <p:grpSpPr>
-        <a:xfrm>
-          <a:off x="0" y="0"/>
-          <a:ext cx="0" cy="0"/>
-          <a:chOff x="0" y="0"/>
-          <a:chExt cx="0" cy="0"/>
-        </a:xfrm>
-      </p:grpSpPr>
-      <p:sp>
-        <p:nvSpPr>
-          <p:cNvPr id="2" name="Title 1">
-            <a:extLst>
-              <a:ext uri="{FF2B5EF4-FFF2-40B4-BE49-F238E27FC236}">
-                <a16:creationId xmlns:a16="http://schemas.microsoft.com/office/drawing/2014/main" id="{245F18AF-B54D-FF57-1C49-84B9320DF682}"/>
-              </a:ext>
-            </a:extLst>
-          </p:cNvPr>
-          <p:cNvSpPr>
-            <a:spLocks noGrp="1"/>
-          </p:cNvSpPr>
-          <p:nvPr>
-            <p:ph type="title"/>
-          </p:nvPr>
-        </p:nvSpPr>
-        <p:spPr/>
-        <p:txBody>
-          <a:bodyPr/>
-          <a:lstStyle/>
-          <a:p>
-            <a:r>
-              <a:rPr lang="en-US" dirty="0"/>
-              <a:t>RAJEEV START HERE</a:t>
-            </a:r>
-          </a:p>
-        </p:txBody>
-      </p:sp>
-      <p:sp>
-        <p:nvSpPr>
-          <p:cNvPr id="3" name="Content Placeholder 2">
-            <a:extLst>
-              <a:ext uri="{FF2B5EF4-FFF2-40B4-BE49-F238E27FC236}">
-                <a16:creationId xmlns:a16="http://schemas.microsoft.com/office/drawing/2014/main" id="{C2CE18FB-6367-DF80-602C-1DE2EFD2EAF4}"/>
-              </a:ext>
-            </a:extLst>
-          </p:cNvPr>
-          <p:cNvSpPr>
-            <a:spLocks noGrp="1"/>
-          </p:cNvSpPr>
-          <p:nvPr>
-            <p:ph idx="1"/>
-          </p:nvPr>
-        </p:nvSpPr>
-        <p:spPr/>
-        <p:txBody>
-          <a:bodyPr/>
-          <a:lstStyle/>
-          <a:p>
-            <a:endParaRPr lang="en-US"/>
-          </a:p>
-        </p:txBody>
-      </p:sp>
-    </p:spTree>
-    <p:extLst>
-      <p:ext uri="{BB962C8B-B14F-4D97-AF65-F5344CB8AC3E}">
-        <p14:creationId xmlns:p14="http://schemas.microsoft.com/office/powerpoint/2010/main" val="129348094"/>
       </p:ext>
     </p:extLst>
   </p:cSld>
@@ -5421,6 +6275,969 @@
     <p:extLst>
       <p:ext uri="{BB962C8B-B14F-4D97-AF65-F5344CB8AC3E}">
         <p14:creationId xmlns:p14="http://schemas.microsoft.com/office/powerpoint/2010/main" val="974841345"/>
+      </p:ext>
+    </p:extLst>
+  </p:cSld>
+  <p:clrMapOvr>
+    <a:masterClrMapping/>
+  </p:clrMapOvr>
+</p:sld>
+</file>
+
+<file path=ppt/slides/slide6.xml><?xml version="1.0" encoding="utf-8"?>
+<p:sld xmlns:a="http://schemas.openxmlformats.org/drawingml/2006/main" xmlns:r="http://schemas.openxmlformats.org/officeDocument/2006/relationships" xmlns:p="http://schemas.openxmlformats.org/presentationml/2006/main">
+  <p:cSld>
+    <p:bg>
+      <p:bgPr>
+        <a:solidFill>
+          <a:srgbClr val="1F4E79"/>
+        </a:solidFill>
+        <a:effectLst/>
+      </p:bgPr>
+    </p:bg>
+    <p:spTree>
+      <p:nvGrpSpPr>
+        <p:cNvPr id="1" name=""/>
+        <p:cNvGrpSpPr/>
+        <p:nvPr/>
+      </p:nvGrpSpPr>
+      <p:grpSpPr>
+        <a:xfrm>
+          <a:off x="0" y="0"/>
+          <a:ext cx="0" cy="0"/>
+          <a:chOff x="0" y="0"/>
+          <a:chExt cx="0" cy="0"/>
+        </a:xfrm>
+      </p:grpSpPr>
+      <p:sp>
+        <p:nvSpPr>
+          <p:cNvPr id="4" name="Title 3">
+            <a:extLst>
+              <a:ext uri="{FF2B5EF4-FFF2-40B4-BE49-F238E27FC236}">
+                <a16:creationId xmlns:a16="http://schemas.microsoft.com/office/drawing/2014/main" id="{34BB7737-EC04-5F55-11BD-E78EE10FC2A4}"/>
+              </a:ext>
+            </a:extLst>
+          </p:cNvPr>
+          <p:cNvSpPr>
+            <a:spLocks noGrp="1"/>
+          </p:cNvSpPr>
+          <p:nvPr>
+            <p:ph type="title"/>
+          </p:nvPr>
+        </p:nvSpPr>
+        <p:spPr>
+          <a:xfrm>
+            <a:off x="741768" y="0"/>
+            <a:ext cx="10515600" cy="1325563"/>
+          </a:xfrm>
+        </p:spPr>
+        <p:txBody>
+          <a:bodyPr/>
+          <a:lstStyle/>
+          <a:p>
+            <a:r>
+              <a:rPr lang="en-US" dirty="0">
+                <a:solidFill>
+                  <a:schemeClr val="bg1"/>
+                </a:solidFill>
+              </a:rPr>
+              <a:t>A Key New Variable: stbcp</a:t>
+            </a:r>
+          </a:p>
+        </p:txBody>
+      </p:sp>
+      <p:sp>
+        <p:nvSpPr>
+          <p:cNvPr id="8" name="TextBox 7">
+            <a:extLst>
+              <a:ext uri="{FF2B5EF4-FFF2-40B4-BE49-F238E27FC236}">
+                <a16:creationId xmlns:a16="http://schemas.microsoft.com/office/drawing/2014/main" id="{BA1C2B61-1451-DF3E-BC3E-45C9C4864253}"/>
+              </a:ext>
+            </a:extLst>
+          </p:cNvPr>
+          <p:cNvSpPr txBox="1"/>
+          <p:nvPr/>
+        </p:nvSpPr>
+        <p:spPr>
+          <a:xfrm>
+            <a:off x="2044353" y="1760602"/>
+            <a:ext cx="7679750" cy="3539430"/>
+          </a:xfrm>
+          <a:prstGeom prst="rect">
+            <a:avLst/>
+          </a:prstGeom>
+          <a:solidFill>
+            <a:srgbClr val="C00000"/>
+          </a:solidFill>
+          <a:ln w="25400">
+            <a:solidFill>
+              <a:schemeClr val="bg1"/>
+            </a:solidFill>
+          </a:ln>
+          <a:effectLst>
+            <a:glow rad="63500">
+              <a:schemeClr val="accent3">
+                <a:satMod val="175000"/>
+                <a:alpha val="40000"/>
+              </a:schemeClr>
+            </a:glow>
+          </a:effectLst>
+        </p:spPr>
+        <p:txBody>
+          <a:bodyPr wrap="square" rtlCol="0">
+            <a:spAutoFit/>
+          </a:bodyPr>
+          <a:lstStyle/>
+          <a:p>
+            <a:pPr algn="ctr"/>
+            <a:r>
+              <a:rPr lang="en-US" sz="2800" dirty="0">
+                <a:solidFill>
+                  <a:schemeClr val="bg1"/>
+                </a:solidFill>
+              </a:rPr>
+              <a:t>stbcp: the proportion of an officer’s body camera being on during a fatal shooting</a:t>
+            </a:r>
+          </a:p>
+          <a:p>
+            <a:pPr algn="ctr"/>
+            <a:endParaRPr lang="en-US" sz="2800" dirty="0">
+              <a:solidFill>
+                <a:schemeClr val="bg1"/>
+              </a:solidFill>
+            </a:endParaRPr>
+          </a:p>
+          <a:p>
+            <a:pPr algn="ctr"/>
+            <a:endParaRPr lang="en-US" sz="2800" dirty="0">
+              <a:solidFill>
+                <a:schemeClr val="bg1"/>
+              </a:solidFill>
+            </a:endParaRPr>
+          </a:p>
+          <a:p>
+            <a:pPr algn="ctr"/>
+            <a:r>
+              <a:rPr lang="en-US" sz="2800" dirty="0">
+                <a:solidFill>
+                  <a:schemeClr val="bg1"/>
+                </a:solidFill>
+              </a:rPr>
+              <a:t>Mean of stbcp= 0.144</a:t>
+            </a:r>
+          </a:p>
+          <a:p>
+            <a:pPr algn="ctr"/>
+            <a:r>
+              <a:rPr lang="en-US" sz="2800" dirty="0">
+                <a:solidFill>
+                  <a:schemeClr val="bg1"/>
+                </a:solidFill>
+              </a:rPr>
+              <a:t>This will allow us to compare states by proportion…</a:t>
+            </a:r>
+          </a:p>
+          <a:p>
+            <a:endParaRPr lang="en-US" sz="2800" dirty="0">
+              <a:solidFill>
+                <a:schemeClr val="bg1"/>
+              </a:solidFill>
+            </a:endParaRPr>
+          </a:p>
+          <a:p>
+            <a:endParaRPr lang="en-US" sz="2800" dirty="0">
+              <a:solidFill>
+                <a:schemeClr val="bg1"/>
+              </a:solidFill>
+            </a:endParaRPr>
+          </a:p>
+        </p:txBody>
+      </p:sp>
+      <p:pic>
+        <p:nvPicPr>
+          <p:cNvPr id="3" name="Picture 2">
+            <a:extLst>
+              <a:ext uri="{FF2B5EF4-FFF2-40B4-BE49-F238E27FC236}">
+                <a16:creationId xmlns:a16="http://schemas.microsoft.com/office/drawing/2014/main" id="{A0DB5940-D77B-752E-ABF6-B2D17625D27E}"/>
+              </a:ext>
+            </a:extLst>
+          </p:cNvPr>
+          <p:cNvPicPr>
+            <a:picLocks noChangeAspect="1"/>
+          </p:cNvPicPr>
+          <p:nvPr/>
+        </p:nvPicPr>
+        <p:blipFill>
+          <a:blip r:embed="rId2"/>
+          <a:stretch>
+            <a:fillRect/>
+          </a:stretch>
+        </p:blipFill>
+        <p:spPr>
+          <a:xfrm>
+            <a:off x="3736258" y="2704843"/>
+            <a:ext cx="4021394" cy="842144"/>
+          </a:xfrm>
+          <a:prstGeom prst="rect">
+            <a:avLst/>
+          </a:prstGeom>
+          <a:ln w="25400">
+            <a:solidFill>
+              <a:schemeClr val="accent1"/>
+            </a:solidFill>
+          </a:ln>
+        </p:spPr>
+      </p:pic>
+    </p:spTree>
+    <p:extLst>
+      <p:ext uri="{BB962C8B-B14F-4D97-AF65-F5344CB8AC3E}">
+        <p14:creationId xmlns:p14="http://schemas.microsoft.com/office/powerpoint/2010/main" val="3727864414"/>
+      </p:ext>
+    </p:extLst>
+  </p:cSld>
+  <p:clrMapOvr>
+    <a:masterClrMapping/>
+  </p:clrMapOvr>
+</p:sld>
+</file>
+
+<file path=ppt/slides/slide7.xml><?xml version="1.0" encoding="utf-8"?>
+<p:sld xmlns:a="http://schemas.openxmlformats.org/drawingml/2006/main" xmlns:r="http://schemas.openxmlformats.org/officeDocument/2006/relationships" xmlns:p="http://schemas.openxmlformats.org/presentationml/2006/main">
+  <p:cSld>
+    <p:bg>
+      <p:bgPr>
+        <a:solidFill>
+          <a:srgbClr val="1F4E79"/>
+        </a:solidFill>
+        <a:effectLst/>
+      </p:bgPr>
+    </p:bg>
+    <p:spTree>
+      <p:nvGrpSpPr>
+        <p:cNvPr id="1" name=""/>
+        <p:cNvGrpSpPr/>
+        <p:nvPr/>
+      </p:nvGrpSpPr>
+      <p:grpSpPr>
+        <a:xfrm>
+          <a:off x="0" y="0"/>
+          <a:ext cx="0" cy="0"/>
+          <a:chOff x="0" y="0"/>
+          <a:chExt cx="0" cy="0"/>
+        </a:xfrm>
+      </p:grpSpPr>
+      <p:sp>
+        <p:nvSpPr>
+          <p:cNvPr id="4" name="Title 3">
+            <a:extLst>
+              <a:ext uri="{FF2B5EF4-FFF2-40B4-BE49-F238E27FC236}">
+                <a16:creationId xmlns:a16="http://schemas.microsoft.com/office/drawing/2014/main" id="{34BB7737-EC04-5F55-11BD-E78EE10FC2A4}"/>
+              </a:ext>
+            </a:extLst>
+          </p:cNvPr>
+          <p:cNvSpPr>
+            <a:spLocks noGrp="1"/>
+          </p:cNvSpPr>
+          <p:nvPr>
+            <p:ph type="title"/>
+          </p:nvPr>
+        </p:nvSpPr>
+        <p:spPr>
+          <a:xfrm>
+            <a:off x="741768" y="0"/>
+            <a:ext cx="10515600" cy="1325563"/>
+          </a:xfrm>
+        </p:spPr>
+        <p:txBody>
+          <a:bodyPr/>
+          <a:lstStyle/>
+          <a:p>
+            <a:r>
+              <a:rPr lang="en-US" dirty="0">
+                <a:solidFill>
+                  <a:schemeClr val="bg1"/>
+                </a:solidFill>
+              </a:rPr>
+              <a:t>Body Cameras By Regions</a:t>
+            </a:r>
+          </a:p>
+        </p:txBody>
+      </p:sp>
+      <p:pic>
+        <p:nvPicPr>
+          <p:cNvPr id="5" name="Picture 4">
+            <a:extLst>
+              <a:ext uri="{FF2B5EF4-FFF2-40B4-BE49-F238E27FC236}">
+                <a16:creationId xmlns:a16="http://schemas.microsoft.com/office/drawing/2014/main" id="{BA5470BA-1516-0571-9AC9-EBF65EB4D898}"/>
+              </a:ext>
+            </a:extLst>
+          </p:cNvPr>
+          <p:cNvPicPr>
+            <a:picLocks noChangeAspect="1"/>
+          </p:cNvPicPr>
+          <p:nvPr/>
+        </p:nvPicPr>
+        <p:blipFill rotWithShape="1">
+          <a:blip r:embed="rId2"/>
+          <a:srcRect r="26225"/>
+          <a:stretch/>
+        </p:blipFill>
+        <p:spPr>
+          <a:xfrm>
+            <a:off x="39535" y="1503282"/>
+            <a:ext cx="6056465" cy="4487210"/>
+          </a:xfrm>
+          <a:prstGeom prst="rect">
+            <a:avLst/>
+          </a:prstGeom>
+          <a:ln w="25400">
+            <a:solidFill>
+              <a:srgbClr val="C00000"/>
+            </a:solidFill>
+          </a:ln>
+        </p:spPr>
+      </p:pic>
+      <p:pic>
+        <p:nvPicPr>
+          <p:cNvPr id="1026" name="Picture 2">
+            <a:extLst>
+              <a:ext uri="{FF2B5EF4-FFF2-40B4-BE49-F238E27FC236}">
+                <a16:creationId xmlns:a16="http://schemas.microsoft.com/office/drawing/2014/main" id="{5FCCFF5C-BE66-AA4D-9028-55919B93F711}"/>
+              </a:ext>
+            </a:extLst>
+          </p:cNvPr>
+          <p:cNvPicPr>
+            <a:picLocks noChangeAspect="1" noChangeArrowheads="1"/>
+          </p:cNvPicPr>
+          <p:nvPr/>
+        </p:nvPicPr>
+        <p:blipFill>
+          <a:blip r:embed="rId3">
+            <a:extLst>
+              <a:ext uri="{28A0092B-C50C-407E-A947-70E740481C1C}">
+                <a14:useLocalDpi xmlns:a14="http://schemas.microsoft.com/office/drawing/2010/main" val="0"/>
+              </a:ext>
+            </a:extLst>
+          </a:blip>
+          <a:srcRect/>
+          <a:stretch>
+            <a:fillRect/>
+          </a:stretch>
+        </p:blipFill>
+        <p:spPr bwMode="auto">
+          <a:xfrm>
+            <a:off x="6276858" y="1503282"/>
+            <a:ext cx="5875607" cy="4487210"/>
+          </a:xfrm>
+          <a:prstGeom prst="rect">
+            <a:avLst/>
+          </a:prstGeom>
+          <a:noFill/>
+          <a:ln w="25400">
+            <a:solidFill>
+              <a:srgbClr val="C00000"/>
+            </a:solidFill>
+          </a:ln>
+          <a:extLst>
+            <a:ext uri="{909E8E84-426E-40DD-AFC4-6F175D3DCCD1}">
+              <a14:hiddenFill xmlns:a14="http://schemas.microsoft.com/office/drawing/2010/main">
+                <a:solidFill>
+                  <a:srgbClr val="FFFFFF"/>
+                </a:solidFill>
+              </a14:hiddenFill>
+            </a:ext>
+          </a:extLst>
+        </p:spPr>
+      </p:pic>
+    </p:spTree>
+    <p:extLst>
+      <p:ext uri="{BB962C8B-B14F-4D97-AF65-F5344CB8AC3E}">
+        <p14:creationId xmlns:p14="http://schemas.microsoft.com/office/powerpoint/2010/main" val="3803746564"/>
+      </p:ext>
+    </p:extLst>
+  </p:cSld>
+  <p:clrMapOvr>
+    <a:masterClrMapping/>
+  </p:clrMapOvr>
+</p:sld>
+</file>
+
+<file path=ppt/slides/slide8.xml><?xml version="1.0" encoding="utf-8"?>
+<p:sld xmlns:a="http://schemas.openxmlformats.org/drawingml/2006/main" xmlns:r="http://schemas.openxmlformats.org/officeDocument/2006/relationships" xmlns:p="http://schemas.openxmlformats.org/presentationml/2006/main">
+  <p:cSld>
+    <p:bg>
+      <p:bgPr>
+        <a:solidFill>
+          <a:srgbClr val="1F4E79"/>
+        </a:solidFill>
+        <a:effectLst/>
+      </p:bgPr>
+    </p:bg>
+    <p:spTree>
+      <p:nvGrpSpPr>
+        <p:cNvPr id="1" name=""/>
+        <p:cNvGrpSpPr/>
+        <p:nvPr/>
+      </p:nvGrpSpPr>
+      <p:grpSpPr>
+        <a:xfrm>
+          <a:off x="0" y="0"/>
+          <a:ext cx="0" cy="0"/>
+          <a:chOff x="0" y="0"/>
+          <a:chExt cx="0" cy="0"/>
+        </a:xfrm>
+      </p:grpSpPr>
+      <p:sp>
+        <p:nvSpPr>
+          <p:cNvPr id="4" name="Title 3">
+            <a:extLst>
+              <a:ext uri="{FF2B5EF4-FFF2-40B4-BE49-F238E27FC236}">
+                <a16:creationId xmlns:a16="http://schemas.microsoft.com/office/drawing/2014/main" id="{34BB7737-EC04-5F55-11BD-E78EE10FC2A4}"/>
+              </a:ext>
+            </a:extLst>
+          </p:cNvPr>
+          <p:cNvSpPr>
+            <a:spLocks noGrp="1"/>
+          </p:cNvSpPr>
+          <p:nvPr>
+            <p:ph type="title"/>
+          </p:nvPr>
+        </p:nvSpPr>
+        <p:spPr>
+          <a:xfrm>
+            <a:off x="741768" y="0"/>
+            <a:ext cx="10515600" cy="1325563"/>
+          </a:xfrm>
+        </p:spPr>
+        <p:txBody>
+          <a:bodyPr>
+            <a:normAutofit/>
+          </a:bodyPr>
+          <a:lstStyle/>
+          <a:p>
+            <a:r>
+              <a:rPr lang="en-US" sz="4000" dirty="0">
+                <a:solidFill>
+                  <a:schemeClr val="bg1"/>
+                </a:solidFill>
+              </a:rPr>
+              <a:t>How Do We Measure A </a:t>
+            </a:r>
+            <a:r>
+              <a:rPr lang="en-US" sz="4000" u="sng" dirty="0">
+                <a:solidFill>
+                  <a:schemeClr val="bg1"/>
+                </a:solidFill>
+              </a:rPr>
+              <a:t>Significant Difference ?</a:t>
+            </a:r>
+            <a:endParaRPr lang="en-US" sz="4000" dirty="0">
+              <a:solidFill>
+                <a:schemeClr val="bg1"/>
+              </a:solidFill>
+            </a:endParaRPr>
+          </a:p>
+        </p:txBody>
+      </p:sp>
+      <p:sp>
+        <p:nvSpPr>
+          <p:cNvPr id="2" name="TextBox 1">
+            <a:extLst>
+              <a:ext uri="{FF2B5EF4-FFF2-40B4-BE49-F238E27FC236}">
+                <a16:creationId xmlns:a16="http://schemas.microsoft.com/office/drawing/2014/main" id="{095DAB90-15F7-E7C6-E152-A77F3559C681}"/>
+              </a:ext>
+            </a:extLst>
+          </p:cNvPr>
+          <p:cNvSpPr txBox="1"/>
+          <p:nvPr/>
+        </p:nvSpPr>
+        <p:spPr>
+          <a:xfrm>
+            <a:off x="222738" y="1225689"/>
+            <a:ext cx="6529754" cy="5632311"/>
+          </a:xfrm>
+          <a:prstGeom prst="rect">
+            <a:avLst/>
+          </a:prstGeom>
+          <a:solidFill>
+            <a:srgbClr val="C00000"/>
+          </a:solidFill>
+          <a:ln>
+            <a:solidFill>
+              <a:schemeClr val="bg1"/>
+            </a:solidFill>
+          </a:ln>
+        </p:spPr>
+        <p:txBody>
+          <a:bodyPr wrap="square" rtlCol="0">
+            <a:spAutoFit/>
+          </a:bodyPr>
+          <a:lstStyle/>
+          <a:p>
+            <a:r>
+              <a:rPr lang="en-US" sz="2400" dirty="0">
+                <a:solidFill>
+                  <a:schemeClr val="bg1"/>
+                </a:solidFill>
+              </a:rPr>
+              <a:t>Introducing: The Chi-Square Test</a:t>
+            </a:r>
+          </a:p>
+          <a:p>
+            <a:pPr marL="342900" indent="-342900">
+              <a:buFont typeface="Arial" panose="020B0604020202020204" pitchFamily="34" charset="0"/>
+              <a:buChar char="•"/>
+            </a:pPr>
+            <a:r>
+              <a:rPr lang="en-US" sz="2400" dirty="0">
+                <a:solidFill>
+                  <a:schemeClr val="bg1"/>
+                </a:solidFill>
+              </a:rPr>
+              <a:t>The Chi-Square Test (X^2)  is a test for comparing distributions of categorical variables</a:t>
+            </a:r>
+          </a:p>
+          <a:p>
+            <a:pPr marL="342900" indent="-342900">
+              <a:buFont typeface="Arial" panose="020B0604020202020204" pitchFamily="34" charset="0"/>
+              <a:buChar char="•"/>
+            </a:pPr>
+            <a:endParaRPr lang="en-US" sz="2400" dirty="0">
+              <a:solidFill>
+                <a:schemeClr val="bg1"/>
+              </a:solidFill>
+            </a:endParaRPr>
+          </a:p>
+          <a:p>
+            <a:pPr marL="342900" indent="-342900">
+              <a:buFont typeface="Arial" panose="020B0604020202020204" pitchFamily="34" charset="0"/>
+              <a:buChar char="•"/>
+            </a:pPr>
+            <a:r>
+              <a:rPr lang="en-US" sz="2400" dirty="0">
+                <a:solidFill>
+                  <a:schemeClr val="bg1"/>
+                </a:solidFill>
+              </a:rPr>
+              <a:t>It works by comparing counts of each category and seeing if they differ from a preconceived “expected amount”</a:t>
+            </a:r>
+          </a:p>
+          <a:p>
+            <a:pPr marL="342900" indent="-342900">
+              <a:buFont typeface="Arial" panose="020B0604020202020204" pitchFamily="34" charset="0"/>
+              <a:buChar char="•"/>
+            </a:pPr>
+            <a:endParaRPr lang="en-US" sz="2400" dirty="0">
+              <a:solidFill>
+                <a:schemeClr val="bg1"/>
+              </a:solidFill>
+            </a:endParaRPr>
+          </a:p>
+          <a:p>
+            <a:pPr marL="342900" indent="-342900">
+              <a:buFont typeface="Arial" panose="020B0604020202020204" pitchFamily="34" charset="0"/>
+              <a:buChar char="•"/>
+            </a:pPr>
+            <a:r>
+              <a:rPr lang="en-US" sz="2400" dirty="0">
+                <a:solidFill>
+                  <a:schemeClr val="bg1"/>
+                </a:solidFill>
+              </a:rPr>
+              <a:t>The Null Hypothesis is always: “The proportions are all equal” and The Alternative Hypothesis is always “The proportions are not all equal”</a:t>
+            </a:r>
+          </a:p>
+          <a:p>
+            <a:pPr marL="342900" indent="-342900">
+              <a:buFont typeface="Arial" panose="020B0604020202020204" pitchFamily="34" charset="0"/>
+              <a:buChar char="•"/>
+            </a:pPr>
+            <a:endParaRPr lang="en-US" sz="2400" dirty="0">
+              <a:solidFill>
+                <a:schemeClr val="bg1"/>
+              </a:solidFill>
+            </a:endParaRPr>
+          </a:p>
+          <a:p>
+            <a:pPr marL="342900" indent="-342900">
+              <a:buFont typeface="Arial" panose="020B0604020202020204" pitchFamily="34" charset="0"/>
+              <a:buChar char="•"/>
+            </a:pPr>
+            <a:r>
+              <a:rPr lang="en-US" sz="2400" dirty="0">
+                <a:solidFill>
+                  <a:schemeClr val="bg1"/>
+                </a:solidFill>
+              </a:rPr>
+              <a:t>This test outputs a p-value (just like Z and T tests)</a:t>
+            </a:r>
+          </a:p>
+          <a:p>
+            <a:pPr marL="342900" indent="-342900">
+              <a:buFont typeface="Arial" panose="020B0604020202020204" pitchFamily="34" charset="0"/>
+              <a:buChar char="•"/>
+            </a:pPr>
+            <a:endParaRPr lang="en-US" sz="2400" dirty="0">
+              <a:solidFill>
+                <a:schemeClr val="bg1"/>
+              </a:solidFill>
+            </a:endParaRPr>
+          </a:p>
+        </p:txBody>
+      </p:sp>
+      <p:pic>
+        <p:nvPicPr>
+          <p:cNvPr id="6" name="Picture 5">
+            <a:extLst>
+              <a:ext uri="{FF2B5EF4-FFF2-40B4-BE49-F238E27FC236}">
+                <a16:creationId xmlns:a16="http://schemas.microsoft.com/office/drawing/2014/main" id="{7A3A98EE-050F-0939-6044-17F9AD463993}"/>
+              </a:ext>
+            </a:extLst>
+          </p:cNvPr>
+          <p:cNvPicPr>
+            <a:picLocks noChangeAspect="1"/>
+          </p:cNvPicPr>
+          <p:nvPr/>
+        </p:nvPicPr>
+        <p:blipFill>
+          <a:blip r:embed="rId2"/>
+          <a:stretch>
+            <a:fillRect/>
+          </a:stretch>
+        </p:blipFill>
+        <p:spPr>
+          <a:xfrm>
+            <a:off x="8296630" y="2842361"/>
+            <a:ext cx="3401049" cy="1173278"/>
+          </a:xfrm>
+          <a:prstGeom prst="rect">
+            <a:avLst/>
+          </a:prstGeom>
+          <a:ln w="25400">
+            <a:solidFill>
+              <a:srgbClr val="C00000"/>
+            </a:solidFill>
+          </a:ln>
+        </p:spPr>
+      </p:pic>
+    </p:spTree>
+    <p:extLst>
+      <p:ext uri="{BB962C8B-B14F-4D97-AF65-F5344CB8AC3E}">
+        <p14:creationId xmlns:p14="http://schemas.microsoft.com/office/powerpoint/2010/main" val="4067586618"/>
+      </p:ext>
+    </p:extLst>
+  </p:cSld>
+  <p:clrMapOvr>
+    <a:masterClrMapping/>
+  </p:clrMapOvr>
+</p:sld>
+</file>
+
+<file path=ppt/slides/slide9.xml><?xml version="1.0" encoding="utf-8"?>
+<p:sld xmlns:a="http://schemas.openxmlformats.org/drawingml/2006/main" xmlns:r="http://schemas.openxmlformats.org/officeDocument/2006/relationships" xmlns:p="http://schemas.openxmlformats.org/presentationml/2006/main">
+  <p:cSld>
+    <p:bg>
+      <p:bgPr>
+        <a:solidFill>
+          <a:srgbClr val="1F4E79"/>
+        </a:solidFill>
+        <a:effectLst/>
+      </p:bgPr>
+    </p:bg>
+    <p:spTree>
+      <p:nvGrpSpPr>
+        <p:cNvPr id="1" name=""/>
+        <p:cNvGrpSpPr/>
+        <p:nvPr/>
+      </p:nvGrpSpPr>
+      <p:grpSpPr>
+        <a:xfrm>
+          <a:off x="0" y="0"/>
+          <a:ext cx="0" cy="0"/>
+          <a:chOff x="0" y="0"/>
+          <a:chExt cx="0" cy="0"/>
+        </a:xfrm>
+      </p:grpSpPr>
+      <p:sp>
+        <p:nvSpPr>
+          <p:cNvPr id="4" name="Title 3">
+            <a:extLst>
+              <a:ext uri="{FF2B5EF4-FFF2-40B4-BE49-F238E27FC236}">
+                <a16:creationId xmlns:a16="http://schemas.microsoft.com/office/drawing/2014/main" id="{34BB7737-EC04-5F55-11BD-E78EE10FC2A4}"/>
+              </a:ext>
+            </a:extLst>
+          </p:cNvPr>
+          <p:cNvSpPr>
+            <a:spLocks noGrp="1"/>
+          </p:cNvSpPr>
+          <p:nvPr>
+            <p:ph type="title"/>
+          </p:nvPr>
+        </p:nvSpPr>
+        <p:spPr>
+          <a:xfrm>
+            <a:off x="741768" y="0"/>
+            <a:ext cx="10515600" cy="1325563"/>
+          </a:xfrm>
+        </p:spPr>
+        <p:txBody>
+          <a:bodyPr>
+            <a:normAutofit/>
+          </a:bodyPr>
+          <a:lstStyle/>
+          <a:p>
+            <a:r>
+              <a:rPr lang="en-US" sz="4000" dirty="0">
+                <a:solidFill>
+                  <a:schemeClr val="bg1"/>
+                </a:solidFill>
+              </a:rPr>
+              <a:t>What are the conditions for using a Chi-Sq Test ?</a:t>
+            </a:r>
+          </a:p>
+        </p:txBody>
+      </p:sp>
+      <p:sp>
+        <p:nvSpPr>
+          <p:cNvPr id="2" name="TextBox 1">
+            <a:extLst>
+              <a:ext uri="{FF2B5EF4-FFF2-40B4-BE49-F238E27FC236}">
+                <a16:creationId xmlns:a16="http://schemas.microsoft.com/office/drawing/2014/main" id="{095DAB90-15F7-E7C6-E152-A77F3559C681}"/>
+              </a:ext>
+            </a:extLst>
+          </p:cNvPr>
+          <p:cNvSpPr txBox="1"/>
+          <p:nvPr/>
+        </p:nvSpPr>
+        <p:spPr>
+          <a:xfrm>
+            <a:off x="0" y="917912"/>
+            <a:ext cx="6529754" cy="5632311"/>
+          </a:xfrm>
+          <a:prstGeom prst="rect">
+            <a:avLst/>
+          </a:prstGeom>
+          <a:solidFill>
+            <a:srgbClr val="C00000"/>
+          </a:solidFill>
+          <a:ln>
+            <a:solidFill>
+              <a:schemeClr val="bg1"/>
+            </a:solidFill>
+          </a:ln>
+        </p:spPr>
+        <p:txBody>
+          <a:bodyPr wrap="square" rtlCol="0">
+            <a:spAutoFit/>
+          </a:bodyPr>
+          <a:lstStyle/>
+          <a:p>
+            <a:r>
+              <a:rPr lang="en-US" sz="2400" dirty="0">
+                <a:solidFill>
+                  <a:schemeClr val="bg1"/>
+                </a:solidFill>
+              </a:rPr>
+              <a:t>Conditions:</a:t>
+            </a:r>
+          </a:p>
+          <a:p>
+            <a:pPr marL="457200" indent="-457200">
+              <a:buAutoNum type="arabicPeriod"/>
+            </a:pPr>
+            <a:r>
+              <a:rPr lang="en-US" sz="2400" b="1" dirty="0">
+                <a:solidFill>
+                  <a:schemeClr val="bg1"/>
+                </a:solidFill>
+              </a:rPr>
+              <a:t>Both Variables are Categorical</a:t>
+            </a:r>
+            <a:r>
+              <a:rPr lang="en-US" sz="2400" dirty="0">
+                <a:solidFill>
+                  <a:schemeClr val="bg1"/>
+                </a:solidFill>
+              </a:rPr>
+              <a:t>:</a:t>
+            </a:r>
+          </a:p>
+          <a:p>
+            <a:pPr lvl="1"/>
+            <a:r>
+              <a:rPr lang="en-US" sz="2400" dirty="0">
+                <a:solidFill>
+                  <a:schemeClr val="bg1"/>
+                </a:solidFill>
+              </a:rPr>
+              <a:t>a. We can check this off because “state” and “body camera” are</a:t>
+            </a:r>
+          </a:p>
+          <a:p>
+            <a:r>
+              <a:rPr lang="en-US" sz="2400" dirty="0">
+                <a:solidFill>
+                  <a:schemeClr val="bg1"/>
+                </a:solidFill>
+              </a:rPr>
+              <a:t>2. </a:t>
+            </a:r>
+            <a:r>
+              <a:rPr lang="en-US" sz="2400" b="1" dirty="0">
+                <a:solidFill>
+                  <a:schemeClr val="bg1"/>
+                </a:solidFill>
+              </a:rPr>
+              <a:t>Independent Observations:</a:t>
+            </a:r>
+          </a:p>
+          <a:p>
+            <a:r>
+              <a:rPr lang="en-US" sz="2400" b="1" dirty="0">
+                <a:solidFill>
+                  <a:schemeClr val="bg1"/>
+                </a:solidFill>
+              </a:rPr>
+              <a:t>	</a:t>
+            </a:r>
+            <a:r>
+              <a:rPr lang="en-US" sz="2400" dirty="0">
+                <a:solidFill>
+                  <a:schemeClr val="bg1"/>
+                </a:solidFill>
+              </a:rPr>
+              <a:t>a. We know our observations to be 	independent as none of them meaningfully 	increase the probability of others (within the 	scope of this project)</a:t>
+            </a:r>
+          </a:p>
+          <a:p>
+            <a:r>
+              <a:rPr lang="en-US" sz="2400" dirty="0">
+                <a:solidFill>
+                  <a:schemeClr val="bg1"/>
+                </a:solidFill>
+              </a:rPr>
+              <a:t>3. </a:t>
+            </a:r>
+            <a:r>
+              <a:rPr lang="en-US" sz="2400" b="1" dirty="0">
+                <a:solidFill>
+                  <a:schemeClr val="bg1"/>
+                </a:solidFill>
+              </a:rPr>
+              <a:t>Mutually Exclusive Categories:</a:t>
+            </a:r>
+          </a:p>
+          <a:p>
+            <a:r>
+              <a:rPr lang="en-US" sz="2400" dirty="0">
+                <a:solidFill>
+                  <a:schemeClr val="bg1"/>
+                </a:solidFill>
+              </a:rPr>
+              <a:t>	a. Satisfied</a:t>
+            </a:r>
+          </a:p>
+          <a:p>
+            <a:r>
+              <a:rPr lang="en-US" sz="2400" dirty="0">
+                <a:solidFill>
+                  <a:schemeClr val="bg1"/>
+                </a:solidFill>
+              </a:rPr>
+              <a:t>4</a:t>
+            </a:r>
+            <a:r>
+              <a:rPr lang="en-US" sz="2400" b="1" dirty="0">
+                <a:solidFill>
+                  <a:schemeClr val="bg1"/>
+                </a:solidFill>
+              </a:rPr>
+              <a:t>. Expected value of cells should be 5 or greater in at least 80% of cells.</a:t>
+            </a:r>
+          </a:p>
+          <a:p>
+            <a:r>
+              <a:rPr lang="en-US" sz="2400" b="1" dirty="0">
+                <a:solidFill>
+                  <a:schemeClr val="bg1"/>
+                </a:solidFill>
+                <a:latin typeface="Helvetica" panose="020B0604020202020204" pitchFamily="34" charset="0"/>
+              </a:rPr>
+              <a:t>	</a:t>
+            </a:r>
+            <a:r>
+              <a:rPr lang="en-US" sz="2400" dirty="0">
+                <a:solidFill>
+                  <a:schemeClr val="bg1"/>
+                </a:solidFill>
+                <a:latin typeface="Helvetica" panose="020B0604020202020204" pitchFamily="34" charset="0"/>
+              </a:rPr>
+              <a:t>a. Let’s talk about that…</a:t>
+            </a:r>
+            <a:endParaRPr lang="en-US" sz="2400" b="1" dirty="0">
+              <a:solidFill>
+                <a:srgbClr val="000000"/>
+              </a:solidFill>
+              <a:latin typeface="Helvetica" panose="020B0604020202020204" pitchFamily="34" charset="0"/>
+            </a:endParaRPr>
+          </a:p>
+          <a:p>
+            <a:r>
+              <a:rPr lang="en-US" sz="2400" b="1" dirty="0">
+                <a:solidFill>
+                  <a:srgbClr val="000000"/>
+                </a:solidFill>
+                <a:latin typeface="Helvetica" panose="020B0604020202020204" pitchFamily="34" charset="0"/>
+              </a:rPr>
+              <a:t>	</a:t>
+            </a:r>
+            <a:endParaRPr lang="en-US" sz="2400" b="1" dirty="0">
+              <a:solidFill>
+                <a:schemeClr val="bg1"/>
+              </a:solidFill>
+            </a:endParaRPr>
+          </a:p>
+        </p:txBody>
+      </p:sp>
+      <p:sp>
+        <p:nvSpPr>
+          <p:cNvPr id="3" name="TextBox 2">
+            <a:extLst>
+              <a:ext uri="{FF2B5EF4-FFF2-40B4-BE49-F238E27FC236}">
+                <a16:creationId xmlns:a16="http://schemas.microsoft.com/office/drawing/2014/main" id="{FD0AFBD4-F079-FCCA-4F36-14BE980953A6}"/>
+              </a:ext>
+            </a:extLst>
+          </p:cNvPr>
+          <p:cNvSpPr txBox="1"/>
+          <p:nvPr/>
+        </p:nvSpPr>
+        <p:spPr>
+          <a:xfrm>
+            <a:off x="7288414" y="6550223"/>
+            <a:ext cx="4903586" cy="307777"/>
+          </a:xfrm>
+          <a:prstGeom prst="rect">
+            <a:avLst/>
+          </a:prstGeom>
+          <a:noFill/>
+        </p:spPr>
+        <p:txBody>
+          <a:bodyPr wrap="none" rtlCol="0">
+            <a:spAutoFit/>
+          </a:bodyPr>
+          <a:lstStyle/>
+          <a:p>
+            <a:r>
+              <a:rPr lang="en-US" sz="1400" dirty="0"/>
+              <a:t>Source: https://www.statology.org/chi-square-test-assumptions/</a:t>
+            </a:r>
+          </a:p>
+        </p:txBody>
+      </p:sp>
+    </p:spTree>
+    <p:extLst>
+      <p:ext uri="{BB962C8B-B14F-4D97-AF65-F5344CB8AC3E}">
+        <p14:creationId xmlns:p14="http://schemas.microsoft.com/office/powerpoint/2010/main" val="2983967090"/>
       </p:ext>
     </p:extLst>
   </p:cSld>

</xml_diff>